<commit_message>
added all intents with memory
</commit_message>
<xml_diff>
--- a/Building An Custom.pptx
+++ b/Building An Custom.pptx
@@ -5,18 +5,19 @@
     <p:sldMasterId id="2147483648" r:id="rId1"/>
   </p:sldMasterIdLst>
   <p:sldIdLst>
-    <p:sldId id="256" r:id="rId2"/>
-    <p:sldId id="257" r:id="rId3"/>
-    <p:sldId id="259" r:id="rId4"/>
-    <p:sldId id="258" r:id="rId5"/>
-    <p:sldId id="260" r:id="rId6"/>
-    <p:sldId id="261" r:id="rId7"/>
-    <p:sldId id="262" r:id="rId8"/>
-    <p:sldId id="264" r:id="rId9"/>
-    <p:sldId id="263" r:id="rId10"/>
-    <p:sldId id="265" r:id="rId11"/>
-    <p:sldId id="266" r:id="rId12"/>
-    <p:sldId id="267" r:id="rId13"/>
+    <p:sldId id="268" r:id="rId2"/>
+    <p:sldId id="269" r:id="rId3"/>
+    <p:sldId id="257" r:id="rId4"/>
+    <p:sldId id="259" r:id="rId5"/>
+    <p:sldId id="258" r:id="rId6"/>
+    <p:sldId id="260" r:id="rId7"/>
+    <p:sldId id="261" r:id="rId8"/>
+    <p:sldId id="262" r:id="rId9"/>
+    <p:sldId id="264" r:id="rId10"/>
+    <p:sldId id="263" r:id="rId11"/>
+    <p:sldId id="265" r:id="rId12"/>
+    <p:sldId id="266" r:id="rId13"/>
+    <p:sldId id="267" r:id="rId14"/>
   </p:sldIdLst>
   <p:sldSz cx="12192000" cy="6858000"/>
   <p:notesSz cx="6858000" cy="9144000"/>
@@ -115,6 +116,11 @@
       </a:defRPr>
     </a:lvl9pPr>
   </p:defaultTextStyle>
+  <p:extLst>
+    <p:ext uri="{EFAFB233-063F-42B5-8137-9DF3F51BA10A}">
+      <p15:sldGuideLst xmlns:p15="http://schemas.microsoft.com/office/powerpoint/2012/main"/>
+    </p:ext>
+  </p:extLst>
 </p:presentation>
 </file>
 
@@ -265,7 +271,7 @@
           <a:p>
             <a:fld id="{D41921DE-9A10-457F-BA6E-89142AAEB166}" type="datetimeFigureOut">
               <a:rPr lang="en-US" smtClean="0"/>
-              <a:t>10/21/2018</a:t>
+              <a:t>10/29/2018</a:t>
             </a:fld>
             <a:endParaRPr lang="en-US"/>
           </a:p>
@@ -463,7 +469,7 @@
           <a:p>
             <a:fld id="{D41921DE-9A10-457F-BA6E-89142AAEB166}" type="datetimeFigureOut">
               <a:rPr lang="en-US" smtClean="0"/>
-              <a:t>10/21/2018</a:t>
+              <a:t>10/29/2018</a:t>
             </a:fld>
             <a:endParaRPr lang="en-US"/>
           </a:p>
@@ -671,7 +677,7 @@
           <a:p>
             <a:fld id="{D41921DE-9A10-457F-BA6E-89142AAEB166}" type="datetimeFigureOut">
               <a:rPr lang="en-US" smtClean="0"/>
-              <a:t>10/21/2018</a:t>
+              <a:t>10/29/2018</a:t>
             </a:fld>
             <a:endParaRPr lang="en-US"/>
           </a:p>
@@ -869,7 +875,7 @@
           <a:p>
             <a:fld id="{D41921DE-9A10-457F-BA6E-89142AAEB166}" type="datetimeFigureOut">
               <a:rPr lang="en-US" smtClean="0"/>
-              <a:t>10/21/2018</a:t>
+              <a:t>10/29/2018</a:t>
             </a:fld>
             <a:endParaRPr lang="en-US"/>
           </a:p>
@@ -1144,7 +1150,7 @@
           <a:p>
             <a:fld id="{D41921DE-9A10-457F-BA6E-89142AAEB166}" type="datetimeFigureOut">
               <a:rPr lang="en-US" smtClean="0"/>
-              <a:t>10/21/2018</a:t>
+              <a:t>10/29/2018</a:t>
             </a:fld>
             <a:endParaRPr lang="en-US"/>
           </a:p>
@@ -1409,7 +1415,7 @@
           <a:p>
             <a:fld id="{D41921DE-9A10-457F-BA6E-89142AAEB166}" type="datetimeFigureOut">
               <a:rPr lang="en-US" smtClean="0"/>
-              <a:t>10/21/2018</a:t>
+              <a:t>10/29/2018</a:t>
             </a:fld>
             <a:endParaRPr lang="en-US"/>
           </a:p>
@@ -1821,7 +1827,7 @@
           <a:p>
             <a:fld id="{D41921DE-9A10-457F-BA6E-89142AAEB166}" type="datetimeFigureOut">
               <a:rPr lang="en-US" smtClean="0"/>
-              <a:t>10/21/2018</a:t>
+              <a:t>10/29/2018</a:t>
             </a:fld>
             <a:endParaRPr lang="en-US"/>
           </a:p>
@@ -1962,7 +1968,7 @@
           <a:p>
             <a:fld id="{D41921DE-9A10-457F-BA6E-89142AAEB166}" type="datetimeFigureOut">
               <a:rPr lang="en-US" smtClean="0"/>
-              <a:t>10/21/2018</a:t>
+              <a:t>10/29/2018</a:t>
             </a:fld>
             <a:endParaRPr lang="en-US"/>
           </a:p>
@@ -2075,7 +2081,7 @@
           <a:p>
             <a:fld id="{D41921DE-9A10-457F-BA6E-89142AAEB166}" type="datetimeFigureOut">
               <a:rPr lang="en-US" smtClean="0"/>
-              <a:t>10/21/2018</a:t>
+              <a:t>10/29/2018</a:t>
             </a:fld>
             <a:endParaRPr lang="en-US"/>
           </a:p>
@@ -2386,7 +2392,7 @@
           <a:p>
             <a:fld id="{D41921DE-9A10-457F-BA6E-89142AAEB166}" type="datetimeFigureOut">
               <a:rPr lang="en-US" smtClean="0"/>
-              <a:t>10/21/2018</a:t>
+              <a:t>10/29/2018</a:t>
             </a:fld>
             <a:endParaRPr lang="en-US"/>
           </a:p>
@@ -2674,7 +2680,7 @@
           <a:p>
             <a:fld id="{D41921DE-9A10-457F-BA6E-89142AAEB166}" type="datetimeFigureOut">
               <a:rPr lang="en-US" smtClean="0"/>
-              <a:t>10/21/2018</a:t>
+              <a:t>10/29/2018</a:t>
             </a:fld>
             <a:endParaRPr lang="en-US"/>
           </a:p>
@@ -2915,7 +2921,7 @@
           <a:p>
             <a:fld id="{D41921DE-9A10-457F-BA6E-89142AAEB166}" type="datetimeFigureOut">
               <a:rPr lang="en-US" smtClean="0"/>
-              <a:t>10/21/2018</a:t>
+              <a:t>10/29/2018</a:t>
             </a:fld>
             <a:endParaRPr lang="en-US"/>
           </a:p>
@@ -3398,7 +3404,7 @@
     </p:spTree>
     <p:extLst>
       <p:ext uri="{BB962C8B-B14F-4D97-AF65-F5344CB8AC3E}">
-        <p14:creationId xmlns:p14="http://schemas.microsoft.com/office/powerpoint/2010/main" val="4294948883"/>
+        <p14:creationId xmlns:p14="http://schemas.microsoft.com/office/powerpoint/2010/main" val="3149596169"/>
       </p:ext>
     </p:extLst>
   </p:cSld>
@@ -3430,7 +3436,7 @@
           <p:cNvPr id="2" name="Title 1">
             <a:extLst>
               <a:ext uri="{FF2B5EF4-FFF2-40B4-BE49-F238E27FC236}">
-                <a16:creationId xmlns:a16="http://schemas.microsoft.com/office/drawing/2014/main" id="{F4E9973C-D474-42E9-AFBF-F9FEF0565B55}"/>
+                <a16:creationId xmlns:a16="http://schemas.microsoft.com/office/drawing/2014/main" id="{FA295848-902A-40FE-8F5B-47BADBA889DA}"/>
               </a:ext>
             </a:extLst>
           </p:cNvPr>
@@ -3448,7 +3454,7 @@
           <a:p>
             <a:r>
               <a:rPr lang="en-US" dirty="0"/>
-              <a:t>Let’s Build One!</a:t>
+              <a:t>Interaction Types</a:t>
             </a:r>
           </a:p>
         </p:txBody>
@@ -3458,7 +3464,7 @@
           <p:cNvPr id="3" name="Content Placeholder 2">
             <a:extLst>
               <a:ext uri="{FF2B5EF4-FFF2-40B4-BE49-F238E27FC236}">
-                <a16:creationId xmlns:a16="http://schemas.microsoft.com/office/drawing/2014/main" id="{7A4ECB46-429B-4553-B530-02602B503A56}"/>
+                <a16:creationId xmlns:a16="http://schemas.microsoft.com/office/drawing/2014/main" id="{02DA7A9E-989D-4538-95D0-453B931B048D}"/>
               </a:ext>
             </a:extLst>
           </p:cNvPr>
@@ -3476,20 +3482,69 @@
           <a:p>
             <a:r>
               <a:rPr lang="en-US" dirty="0"/>
-              <a:t>[Insert topic here]</a:t>
-            </a:r>
-          </a:p>
-          <a:p>
-            <a:r>
-              <a:rPr lang="en-US" dirty="0"/>
-              <a:t>Sample Intents:</a:t>
+              <a:t>Single Command</a:t>
             </a:r>
           </a:p>
           <a:p>
             <a:pPr lvl="1"/>
             <a:r>
               <a:rPr lang="en-US" dirty="0"/>
-              <a:t>“[insert intents here]”</a:t>
+              <a:t>User: “Alexa ask ESPN for the score of the Viking game.”</a:t>
+            </a:r>
+          </a:p>
+          <a:p>
+            <a:pPr lvl="2"/>
+            <a:r>
+              <a:rPr lang="en-US" dirty="0"/>
+              <a:t>Alexa: “The score of the Viking Packer game is 21-13, Vikings in the lead.”</a:t>
+            </a:r>
+          </a:p>
+          <a:p>
+            <a:r>
+              <a:rPr lang="en-US" dirty="0"/>
+              <a:t>Sessions</a:t>
+            </a:r>
+          </a:p>
+          <a:p>
+            <a:pPr lvl="1"/>
+            <a:r>
+              <a:rPr lang="en-US" dirty="0"/>
+              <a:t>Do not require user to say invocation name every command</a:t>
+            </a:r>
+          </a:p>
+          <a:p>
+            <a:pPr lvl="1"/>
+            <a:r>
+              <a:rPr lang="en-US" dirty="0"/>
+              <a:t>User: “Alexa open ESPN”</a:t>
+            </a:r>
+          </a:p>
+          <a:p>
+            <a:pPr lvl="2"/>
+            <a:r>
+              <a:rPr lang="en-US" dirty="0"/>
+              <a:t>Alexa ESPN skill: “Welcome to ESPN, how can I help you?”</a:t>
+            </a:r>
+          </a:p>
+          <a:p>
+            <a:pPr lvl="2"/>
+            <a:r>
+              <a:rPr lang="en-US" dirty="0"/>
+              <a:t>User: “How are Minnesota sports doing?”</a:t>
+            </a:r>
+          </a:p>
+          <a:p>
+            <a:pPr lvl="2"/>
+            <a:r>
+              <a:rPr lang="en-US" dirty="0"/>
+              <a:t>Alexa ESPN skill: “Minnesota Wild are have a record of 3-1-1 and the Twins have a record of 23-33.”</a:t>
+            </a:r>
+          </a:p>
+          <a:p>
+            <a:pPr lvl="2"/>
+            <a:r>
+              <a:rPr lang="en-US" dirty="0"/>
+              <a:t>…</a:t>
             </a:r>
           </a:p>
         </p:txBody>
@@ -3497,7 +3552,7 @@
     </p:spTree>
     <p:extLst>
       <p:ext uri="{BB962C8B-B14F-4D97-AF65-F5344CB8AC3E}">
-        <p14:creationId xmlns:p14="http://schemas.microsoft.com/office/powerpoint/2010/main" val="4221358634"/>
+        <p14:creationId xmlns:p14="http://schemas.microsoft.com/office/powerpoint/2010/main" val="1769388970"/>
       </p:ext>
     </p:extLst>
   </p:cSld>
@@ -3529,6 +3584,132 @@
           <p:cNvPr id="2" name="Title 1">
             <a:extLst>
               <a:ext uri="{FF2B5EF4-FFF2-40B4-BE49-F238E27FC236}">
+                <a16:creationId xmlns:a16="http://schemas.microsoft.com/office/drawing/2014/main" id="{F4E9973C-D474-42E9-AFBF-F9FEF0565B55}"/>
+              </a:ext>
+            </a:extLst>
+          </p:cNvPr>
+          <p:cNvSpPr>
+            <a:spLocks noGrp="1"/>
+          </p:cNvSpPr>
+          <p:nvPr>
+            <p:ph type="title"/>
+          </p:nvPr>
+        </p:nvSpPr>
+        <p:spPr/>
+        <p:txBody>
+          <a:bodyPr/>
+          <a:lstStyle/>
+          <a:p>
+            <a:r>
+              <a:rPr lang="en-US" dirty="0"/>
+              <a:t>Let’s Build One!</a:t>
+            </a:r>
+          </a:p>
+        </p:txBody>
+      </p:sp>
+      <p:sp>
+        <p:nvSpPr>
+          <p:cNvPr id="3" name="Content Placeholder 2">
+            <a:extLst>
+              <a:ext uri="{FF2B5EF4-FFF2-40B4-BE49-F238E27FC236}">
+                <a16:creationId xmlns:a16="http://schemas.microsoft.com/office/drawing/2014/main" id="{7A4ECB46-429B-4553-B530-02602B503A56}"/>
+              </a:ext>
+            </a:extLst>
+          </p:cNvPr>
+          <p:cNvSpPr>
+            <a:spLocks noGrp="1"/>
+          </p:cNvSpPr>
+          <p:nvPr>
+            <p:ph idx="1"/>
+          </p:nvPr>
+        </p:nvSpPr>
+        <p:spPr/>
+        <p:txBody>
+          <a:bodyPr/>
+          <a:lstStyle/>
+          <a:p>
+            <a:r>
+              <a:rPr lang="en-US" dirty="0"/>
+              <a:t>Stocks</a:t>
+            </a:r>
+          </a:p>
+          <a:p>
+            <a:r>
+              <a:rPr lang="en-US" dirty="0"/>
+              <a:t>Sample Intents:</a:t>
+            </a:r>
+          </a:p>
+          <a:p>
+            <a:pPr lvl="1"/>
+            <a:r>
+              <a:rPr lang="en-US" dirty="0"/>
+              <a:t>“What is the price of Apple’s stock?”</a:t>
+            </a:r>
+          </a:p>
+          <a:p>
+            <a:pPr lvl="1"/>
+            <a:r>
+              <a:rPr lang="en-US" dirty="0"/>
+              <a:t>“Who is the CEO of Tesla?”</a:t>
+            </a:r>
+          </a:p>
+          <a:p>
+            <a:pPr lvl="1"/>
+            <a:r>
+              <a:rPr lang="en-US" dirty="0"/>
+              <a:t>“What industry is Tesla in?”</a:t>
+            </a:r>
+          </a:p>
+          <a:p>
+            <a:r>
+              <a:rPr lang="en-US" dirty="0"/>
+              <a:t>Give Alexa a memory</a:t>
+            </a:r>
+          </a:p>
+          <a:p>
+            <a:pPr lvl="1"/>
+            <a:r>
+              <a:rPr lang="en-US" dirty="0"/>
+              <a:t>User will not need to say company name each time</a:t>
+            </a:r>
+          </a:p>
+        </p:txBody>
+      </p:sp>
+    </p:spTree>
+    <p:extLst>
+      <p:ext uri="{BB962C8B-B14F-4D97-AF65-F5344CB8AC3E}">
+        <p14:creationId xmlns:p14="http://schemas.microsoft.com/office/powerpoint/2010/main" val="4221358634"/>
+      </p:ext>
+    </p:extLst>
+  </p:cSld>
+  <p:clrMapOvr>
+    <a:masterClrMapping/>
+  </p:clrMapOvr>
+</p:sld>
+</file>
+
+<file path=ppt/slides/slide12.xml><?xml version="1.0" encoding="utf-8"?>
+<p:sld xmlns:a="http://schemas.openxmlformats.org/drawingml/2006/main" xmlns:r="http://schemas.openxmlformats.org/officeDocument/2006/relationships" xmlns:p="http://schemas.openxmlformats.org/presentationml/2006/main">
+  <p:cSld>
+    <p:spTree>
+      <p:nvGrpSpPr>
+        <p:cNvPr id="1" name=""/>
+        <p:cNvGrpSpPr/>
+        <p:nvPr/>
+      </p:nvGrpSpPr>
+      <p:grpSpPr>
+        <a:xfrm>
+          <a:off x="0" y="0"/>
+          <a:ext cx="0" cy="0"/>
+          <a:chOff x="0" y="0"/>
+          <a:chExt cx="0" cy="0"/>
+        </a:xfrm>
+      </p:grpSpPr>
+      <p:sp>
+        <p:nvSpPr>
+          <p:cNvPr id="2" name="Title 1">
+            <a:extLst>
+              <a:ext uri="{FF2B5EF4-FFF2-40B4-BE49-F238E27FC236}">
                 <a16:creationId xmlns:a16="http://schemas.microsoft.com/office/drawing/2014/main" id="{7BE69B2F-4DE4-4FBD-BB64-CEDCB6DB66E7}"/>
               </a:ext>
             </a:extLst>
@@ -3648,7 +3829,7 @@
 </p:sld>
 </file>
 
-<file path=ppt/slides/slide12.xml><?xml version="1.0" encoding="utf-8"?>
+<file path=ppt/slides/slide13.xml><?xml version="1.0" encoding="utf-8"?>
 <p:sld xmlns:a="http://schemas.openxmlformats.org/drawingml/2006/main" xmlns:r="http://schemas.openxmlformats.org/officeDocument/2006/relationships" xmlns:p="http://schemas.openxmlformats.org/presentationml/2006/main">
   <p:cSld>
     <p:spTree>
@@ -3794,7 +3975,7 @@
           <p:cNvPr id="2" name="Title 1">
             <a:extLst>
               <a:ext uri="{FF2B5EF4-FFF2-40B4-BE49-F238E27FC236}">
-                <a16:creationId xmlns:a16="http://schemas.microsoft.com/office/drawing/2014/main" id="{D8CFACD9-252B-464F-8ECC-0FBD04808441}"/>
+                <a16:creationId xmlns:a16="http://schemas.microsoft.com/office/drawing/2014/main" id="{613835D5-69E2-4D87-97C5-6A185B0E0850}"/>
               </a:ext>
             </a:extLst>
           </p:cNvPr>
@@ -3812,7 +3993,7 @@
           <a:p>
             <a:r>
               <a:rPr lang="en-US" dirty="0"/>
-              <a:t>Overview for Today</a:t>
+              <a:t>Who Am I?</a:t>
             </a:r>
           </a:p>
         </p:txBody>
@@ -3822,7 +4003,7 @@
           <p:cNvPr id="3" name="Content Placeholder 2">
             <a:extLst>
               <a:ext uri="{FF2B5EF4-FFF2-40B4-BE49-F238E27FC236}">
-                <a16:creationId xmlns:a16="http://schemas.microsoft.com/office/drawing/2014/main" id="{6F116386-D81D-4B46-B7E5-741EC6D29952}"/>
+                <a16:creationId xmlns:a16="http://schemas.microsoft.com/office/drawing/2014/main" id="{00AF2883-D1F8-4BB4-837C-9EEB588A9BAA}"/>
               </a:ext>
             </a:extLst>
           </p:cNvPr>
@@ -3840,49 +4021,30 @@
           <a:p>
             <a:r>
               <a:rPr lang="en-US" dirty="0"/>
-              <a:t>Implementing, Deploying Custom Alexa Skill</a:t>
-            </a:r>
-          </a:p>
-          <a:p>
-            <a:pPr lvl="1"/>
-            <a:r>
-              <a:rPr lang="en-US" dirty="0"/>
-              <a:t>Alexa Skills Kit Command Line Interface (ASK CLI)</a:t>
-            </a:r>
-          </a:p>
-          <a:p>
-            <a:pPr lvl="1"/>
-            <a:r>
-              <a:rPr lang="en-US" dirty="0"/>
-              <a:t>AWS Lambda</a:t>
-            </a:r>
-          </a:p>
-          <a:p>
-            <a:pPr lvl="1"/>
-            <a:r>
-              <a:rPr lang="en-US" dirty="0"/>
-              <a:t>Node.js</a:t>
-            </a:r>
-          </a:p>
-          <a:p>
-            <a:r>
-              <a:rPr lang="en-US" dirty="0"/>
-              <a:t>How to consume a public API</a:t>
-            </a:r>
-          </a:p>
-          <a:p>
-            <a:pPr lvl="1"/>
-            <a:r>
-              <a:rPr lang="en-US" dirty="0"/>
-              <a:t>[insert site for data here]</a:t>
-            </a:r>
+              <a:t>Software Engineer </a:t>
+            </a:r>
+          </a:p>
+          <a:p>
+            <a:r>
+              <a:rPr lang="en-US" dirty="0"/>
+              <a:t>Currently working at C.H. Robinson from 9-5</a:t>
+            </a:r>
+          </a:p>
+          <a:p>
+            <a:r>
+              <a:rPr lang="en-US" dirty="0"/>
+              <a:t>I build cool software on the side</a:t>
+            </a:r>
+          </a:p>
+          <a:p>
+            <a:endParaRPr lang="en-US" dirty="0"/>
           </a:p>
         </p:txBody>
       </p:sp>
     </p:spTree>
     <p:extLst>
       <p:ext uri="{BB962C8B-B14F-4D97-AF65-F5344CB8AC3E}">
-        <p14:creationId xmlns:p14="http://schemas.microsoft.com/office/powerpoint/2010/main" val="3985130253"/>
+        <p14:creationId xmlns:p14="http://schemas.microsoft.com/office/powerpoint/2010/main" val="504703730"/>
       </p:ext>
     </p:extLst>
   </p:cSld>
@@ -3914,7 +4076,7 @@
           <p:cNvPr id="2" name="Title 1">
             <a:extLst>
               <a:ext uri="{FF2B5EF4-FFF2-40B4-BE49-F238E27FC236}">
-                <a16:creationId xmlns:a16="http://schemas.microsoft.com/office/drawing/2014/main" id="{AAF68D47-6D31-43EF-A9AA-C275631E2842}"/>
+                <a16:creationId xmlns:a16="http://schemas.microsoft.com/office/drawing/2014/main" id="{D8CFACD9-252B-464F-8ECC-0FBD04808441}"/>
               </a:ext>
             </a:extLst>
           </p:cNvPr>
@@ -3932,7 +4094,7 @@
           <a:p>
             <a:r>
               <a:rPr lang="en-US" dirty="0"/>
-              <a:t>What Makes a Skill?</a:t>
+              <a:t>Overview for Today</a:t>
             </a:r>
           </a:p>
         </p:txBody>
@@ -3942,7 +4104,7 @@
           <p:cNvPr id="3" name="Content Placeholder 2">
             <a:extLst>
               <a:ext uri="{FF2B5EF4-FFF2-40B4-BE49-F238E27FC236}">
-                <a16:creationId xmlns:a16="http://schemas.microsoft.com/office/drawing/2014/main" id="{CE4643B2-1E5E-43B1-AB0F-0C754F3AD670}"/>
+                <a16:creationId xmlns:a16="http://schemas.microsoft.com/office/drawing/2014/main" id="{6F116386-D81D-4B46-B7E5-741EC6D29952}"/>
               </a:ext>
             </a:extLst>
           </p:cNvPr>
@@ -3960,16 +4122,51 @@
           <a:p>
             <a:r>
               <a:rPr lang="en-US" dirty="0"/>
-              <a:t>JSON File</a:t>
-            </a:r>
-          </a:p>
-          <a:p>
-            <a:r>
-              <a:rPr lang="en-US" dirty="0"/>
-              <a:t>JavaScript File</a:t>
-            </a:r>
-          </a:p>
-          <a:p>
+              <a:t>Implementing, Deploying Custom Alexa Skill</a:t>
+            </a:r>
+          </a:p>
+          <a:p>
+            <a:pPr lvl="1"/>
+            <a:r>
+              <a:rPr lang="en-US" dirty="0"/>
+              <a:t>Alexa Skills Kit Command Line Interface (ASK CLI)</a:t>
+            </a:r>
+          </a:p>
+          <a:p>
+            <a:pPr lvl="1"/>
+            <a:r>
+              <a:rPr lang="en-US" dirty="0"/>
+              <a:t>AWS Lambda</a:t>
+            </a:r>
+          </a:p>
+          <a:p>
+            <a:pPr lvl="1"/>
+            <a:r>
+              <a:rPr lang="en-US" dirty="0"/>
+              <a:t>Node.js</a:t>
+            </a:r>
+          </a:p>
+          <a:p>
+            <a:r>
+              <a:rPr lang="en-US" dirty="0"/>
+              <a:t>How to consume a public API</a:t>
+            </a:r>
+          </a:p>
+          <a:p>
+            <a:pPr lvl="1"/>
+            <a:r>
+              <a:rPr lang="en-US" dirty="0"/>
+              <a:t>IEX Trading API</a:t>
+            </a:r>
+          </a:p>
+          <a:p>
+            <a:pPr lvl="2"/>
+            <a:r>
+              <a:rPr lang="en-US" dirty="0">
+                <a:hlinkClick r:id="rId2"/>
+              </a:rPr>
+              <a:t>https://iextrading.com/developer/docs/#getting-started</a:t>
+            </a:r>
             <a:endParaRPr lang="en-US" dirty="0"/>
           </a:p>
         </p:txBody>
@@ -3977,7 +4174,7 @@
     </p:spTree>
     <p:extLst>
       <p:ext uri="{BB962C8B-B14F-4D97-AF65-F5344CB8AC3E}">
-        <p14:creationId xmlns:p14="http://schemas.microsoft.com/office/powerpoint/2010/main" val="1035418609"/>
+        <p14:creationId xmlns:p14="http://schemas.microsoft.com/office/powerpoint/2010/main" val="3985130253"/>
       </p:ext>
     </p:extLst>
   </p:cSld>
@@ -4009,7 +4206,7 @@
           <p:cNvPr id="2" name="Title 1">
             <a:extLst>
               <a:ext uri="{FF2B5EF4-FFF2-40B4-BE49-F238E27FC236}">
-                <a16:creationId xmlns:a16="http://schemas.microsoft.com/office/drawing/2014/main" id="{EFC4A874-CCC4-4998-BDAB-E0A6E1783627}"/>
+                <a16:creationId xmlns:a16="http://schemas.microsoft.com/office/drawing/2014/main" id="{AAF68D47-6D31-43EF-A9AA-C275631E2842}"/>
               </a:ext>
             </a:extLst>
           </p:cNvPr>
@@ -4027,7 +4224,7 @@
           <a:p>
             <a:r>
               <a:rPr lang="en-US" dirty="0"/>
-              <a:t>No, its that simple but there is a bit more…</a:t>
+              <a:t>What Makes a Skill?</a:t>
             </a:r>
           </a:p>
         </p:txBody>
@@ -4037,7 +4234,7 @@
           <p:cNvPr id="3" name="Content Placeholder 2">
             <a:extLst>
               <a:ext uri="{FF2B5EF4-FFF2-40B4-BE49-F238E27FC236}">
-                <a16:creationId xmlns:a16="http://schemas.microsoft.com/office/drawing/2014/main" id="{F0A553D2-B111-42C0-9A6A-010365C72DD6}"/>
+                <a16:creationId xmlns:a16="http://schemas.microsoft.com/office/drawing/2014/main" id="{CE4643B2-1E5E-43B1-AB0F-0C754F3AD670}"/>
               </a:ext>
             </a:extLst>
           </p:cNvPr>
@@ -4055,62 +4252,13 @@
           <a:p>
             <a:r>
               <a:rPr lang="en-US" dirty="0"/>
-              <a:t>Interaction Model (JSON File)</a:t>
-            </a:r>
-          </a:p>
-          <a:p>
-            <a:pPr lvl="1"/>
-            <a:r>
-              <a:rPr lang="en-US" dirty="0"/>
-              <a:t>Invocation Name</a:t>
-            </a:r>
-          </a:p>
-          <a:p>
-            <a:pPr lvl="1"/>
-            <a:r>
-              <a:rPr lang="en-US" dirty="0"/>
-              <a:t>Intents</a:t>
-            </a:r>
-          </a:p>
-          <a:p>
-            <a:pPr lvl="2"/>
-            <a:r>
-              <a:rPr lang="en-US" dirty="0"/>
-              <a:t>Built-In Intents</a:t>
-            </a:r>
-          </a:p>
-          <a:p>
-            <a:pPr lvl="2"/>
-            <a:r>
-              <a:rPr lang="en-US" dirty="0"/>
-              <a:t>User-defined Intents</a:t>
-            </a:r>
-          </a:p>
-          <a:p>
-            <a:pPr lvl="1"/>
-            <a:r>
-              <a:rPr lang="en-US" dirty="0"/>
-              <a:t>Slot Types</a:t>
-            </a:r>
-          </a:p>
-          <a:p>
-            <a:r>
-              <a:rPr lang="en-US" dirty="0"/>
-              <a:t>Logic (JavaScript File)</a:t>
-            </a:r>
-          </a:p>
-          <a:p>
-            <a:pPr lvl="1"/>
-            <a:r>
-              <a:rPr lang="en-US" dirty="0"/>
-              <a:t>AWS Lambda</a:t>
-            </a:r>
-          </a:p>
-          <a:p>
-            <a:pPr lvl="1"/>
-            <a:r>
-              <a:rPr lang="en-US" dirty="0"/>
-              <a:t>API</a:t>
+              <a:t>JSON File</a:t>
+            </a:r>
+          </a:p>
+          <a:p>
+            <a:r>
+              <a:rPr lang="en-US" dirty="0"/>
+              <a:t>JavaScript File</a:t>
             </a:r>
           </a:p>
           <a:p>
@@ -4121,7 +4269,7 @@
     </p:spTree>
     <p:extLst>
       <p:ext uri="{BB962C8B-B14F-4D97-AF65-F5344CB8AC3E}">
-        <p14:creationId xmlns:p14="http://schemas.microsoft.com/office/powerpoint/2010/main" val="3693376404"/>
+        <p14:creationId xmlns:p14="http://schemas.microsoft.com/office/powerpoint/2010/main" val="1035418609"/>
       </p:ext>
     </p:extLst>
   </p:cSld>
@@ -4153,7 +4301,7 @@
           <p:cNvPr id="2" name="Title 1">
             <a:extLst>
               <a:ext uri="{FF2B5EF4-FFF2-40B4-BE49-F238E27FC236}">
-                <a16:creationId xmlns:a16="http://schemas.microsoft.com/office/drawing/2014/main" id="{69D563AD-3ACB-4C04-A21D-A27B271EA43A}"/>
+                <a16:creationId xmlns:a16="http://schemas.microsoft.com/office/drawing/2014/main" id="{EFC4A874-CCC4-4998-BDAB-E0A6E1783627}"/>
               </a:ext>
             </a:extLst>
           </p:cNvPr>
@@ -4171,56 +4319,101 @@
           <a:p>
             <a:r>
               <a:rPr lang="en-US" dirty="0"/>
+              <a:t>No, its that simple but there is a bit more…</a:t>
+            </a:r>
+          </a:p>
+        </p:txBody>
+      </p:sp>
+      <p:sp>
+        <p:nvSpPr>
+          <p:cNvPr id="3" name="Content Placeholder 2">
+            <a:extLst>
+              <a:ext uri="{FF2B5EF4-FFF2-40B4-BE49-F238E27FC236}">
+                <a16:creationId xmlns:a16="http://schemas.microsoft.com/office/drawing/2014/main" id="{F0A553D2-B111-42C0-9A6A-010365C72DD6}"/>
+              </a:ext>
+            </a:extLst>
+          </p:cNvPr>
+          <p:cNvSpPr>
+            <a:spLocks noGrp="1"/>
+          </p:cNvSpPr>
+          <p:nvPr>
+            <p:ph idx="1"/>
+          </p:nvPr>
+        </p:nvSpPr>
+        <p:spPr/>
+        <p:txBody>
+          <a:bodyPr/>
+          <a:lstStyle/>
+          <a:p>
+            <a:r>
+              <a:rPr lang="en-US" dirty="0"/>
+              <a:t>Interaction Model (JSON File)</a:t>
+            </a:r>
+          </a:p>
+          <a:p>
+            <a:pPr lvl="1"/>
+            <a:r>
+              <a:rPr lang="en-US" dirty="0"/>
               <a:t>Invocation Name</a:t>
             </a:r>
           </a:p>
-        </p:txBody>
-      </p:sp>
-      <p:sp>
-        <p:nvSpPr>
-          <p:cNvPr id="3" name="Content Placeholder 2">
-            <a:extLst>
-              <a:ext uri="{FF2B5EF4-FFF2-40B4-BE49-F238E27FC236}">
-                <a16:creationId xmlns:a16="http://schemas.microsoft.com/office/drawing/2014/main" id="{1D6D181A-2A0D-400E-9329-7797534DE5CB}"/>
-              </a:ext>
-            </a:extLst>
-          </p:cNvPr>
-          <p:cNvSpPr>
-            <a:spLocks noGrp="1"/>
-          </p:cNvSpPr>
-          <p:nvPr>
-            <p:ph idx="1"/>
-          </p:nvPr>
-        </p:nvSpPr>
-        <p:spPr/>
-        <p:txBody>
-          <a:bodyPr/>
-          <a:lstStyle/>
-          <a:p>
-            <a:r>
-              <a:rPr lang="en-US" dirty="0"/>
-              <a:t>The name that the user will use to start the interaction with your custom skill</a:t>
-            </a:r>
-          </a:p>
-          <a:p>
-            <a:r>
-              <a:rPr lang="en-US" dirty="0"/>
-              <a:t>For example, if the invocation name is “ESPN”, users can say:</a:t>
-            </a:r>
-          </a:p>
           <a:p>
             <a:pPr lvl="1"/>
             <a:r>
               <a:rPr lang="en-US" dirty="0"/>
-              <a:t>“Alexa, ask ESPN for the score of the Viking game.”</a:t>
-            </a:r>
+              <a:t>Intents</a:t>
+            </a:r>
+          </a:p>
+          <a:p>
+            <a:pPr lvl="2"/>
+            <a:r>
+              <a:rPr lang="en-US" dirty="0"/>
+              <a:t>Built-In Intents</a:t>
+            </a:r>
+          </a:p>
+          <a:p>
+            <a:pPr lvl="2"/>
+            <a:r>
+              <a:rPr lang="en-US" dirty="0"/>
+              <a:t>User-defined Intents</a:t>
+            </a:r>
+          </a:p>
+          <a:p>
+            <a:pPr lvl="1"/>
+            <a:r>
+              <a:rPr lang="en-US" dirty="0"/>
+              <a:t>Slot Types</a:t>
+            </a:r>
+          </a:p>
+          <a:p>
+            <a:r>
+              <a:rPr lang="en-US" dirty="0"/>
+              <a:t>Logic (JavaScript File)</a:t>
+            </a:r>
+          </a:p>
+          <a:p>
+            <a:pPr lvl="1"/>
+            <a:r>
+              <a:rPr lang="en-US" dirty="0"/>
+              <a:t>AWS Lambda</a:t>
+            </a:r>
+          </a:p>
+          <a:p>
+            <a:pPr lvl="1"/>
+            <a:r>
+              <a:rPr lang="en-US" dirty="0"/>
+              <a:t>API</a:t>
+            </a:r>
+          </a:p>
+          <a:p>
+            <a:endParaRPr lang="en-US" dirty="0"/>
           </a:p>
         </p:txBody>
       </p:sp>
     </p:spTree>
     <p:extLst>
       <p:ext uri="{BB962C8B-B14F-4D97-AF65-F5344CB8AC3E}">
-        <p14:creationId xmlns:p14="http://schemas.microsoft.com/office/powerpoint/2010/main" val="1225673664"/>
+        <p14:creationId xmlns:p14="http://schemas.microsoft.com/office/powerpoint/2010/main" val="3693376404"/>
       </p:ext>
     </p:extLst>
   </p:cSld>
@@ -4252,7 +4445,7 @@
           <p:cNvPr id="2" name="Title 1">
             <a:extLst>
               <a:ext uri="{FF2B5EF4-FFF2-40B4-BE49-F238E27FC236}">
-                <a16:creationId xmlns:a16="http://schemas.microsoft.com/office/drawing/2014/main" id="{A1BD2057-6022-4829-87F9-368062B452E3}"/>
+                <a16:creationId xmlns:a16="http://schemas.microsoft.com/office/drawing/2014/main" id="{69D563AD-3ACB-4C04-A21D-A27B271EA43A}"/>
               </a:ext>
             </a:extLst>
           </p:cNvPr>
@@ -4270,7 +4463,7 @@
           <a:p>
             <a:r>
               <a:rPr lang="en-US" dirty="0"/>
-              <a:t>Intents</a:t>
+              <a:t>Invocation Name</a:t>
             </a:r>
           </a:p>
         </p:txBody>
@@ -4280,7 +4473,7 @@
           <p:cNvPr id="3" name="Content Placeholder 2">
             <a:extLst>
               <a:ext uri="{FF2B5EF4-FFF2-40B4-BE49-F238E27FC236}">
-                <a16:creationId xmlns:a16="http://schemas.microsoft.com/office/drawing/2014/main" id="{8A626891-DEE4-4575-B99B-D230647CBC80}"/>
+                <a16:creationId xmlns:a16="http://schemas.microsoft.com/office/drawing/2014/main" id="{1D6D181A-2A0D-400E-9329-7797534DE5CB}"/>
               </a:ext>
             </a:extLst>
           </p:cNvPr>
@@ -4298,93 +4491,28 @@
           <a:p>
             <a:r>
               <a:rPr lang="en-US" dirty="0"/>
-              <a:t>Built-In Intents</a:t>
+              <a:t>The name that the user will use to start the interaction with your custom skill</a:t>
+            </a:r>
+          </a:p>
+          <a:p>
+            <a:r>
+              <a:rPr lang="en-US" dirty="0"/>
+              <a:t>For example, if the invocation name is “ESPN”, users can say:</a:t>
             </a:r>
           </a:p>
           <a:p>
             <a:pPr lvl="1"/>
             <a:r>
-              <a:rPr lang="en-US" dirty="0" err="1"/>
-              <a:t>AMAZON.CancelIntent</a:t>
-            </a:r>
-            <a:endParaRPr lang="en-US" dirty="0"/>
-          </a:p>
-          <a:p>
-            <a:pPr lvl="2"/>
-            <a:r>
-              <a:rPr lang="en-US" dirty="0"/>
-              <a:t>Invoked when user interrupts current intent by saying “Alexa Cancel”</a:t>
-            </a:r>
-          </a:p>
-          <a:p>
-            <a:pPr lvl="1"/>
-            <a:r>
-              <a:rPr lang="en-US" dirty="0" err="1"/>
-              <a:t>AMAZON.HelpIntent</a:t>
-            </a:r>
-            <a:endParaRPr lang="en-US" dirty="0"/>
-          </a:p>
-          <a:p>
-            <a:pPr lvl="2"/>
-            <a:r>
-              <a:rPr lang="en-US" dirty="0"/>
-              <a:t>Invoked when user needs help with what to do within a custom skill</a:t>
-            </a:r>
-          </a:p>
-          <a:p>
-            <a:pPr lvl="2"/>
-            <a:r>
-              <a:rPr lang="en-US" dirty="0"/>
-              <a:t>Provides sample commands</a:t>
-            </a:r>
-          </a:p>
-          <a:p>
-            <a:pPr lvl="1"/>
-            <a:r>
-              <a:rPr lang="en-US" dirty="0" err="1"/>
-              <a:t>AMAZON.FallbackIntent</a:t>
-            </a:r>
-            <a:endParaRPr lang="en-US" dirty="0"/>
-          </a:p>
-          <a:p>
-            <a:pPr lvl="2"/>
-            <a:r>
-              <a:rPr lang="en-US" dirty="0"/>
-              <a:t>Invoked when user’s command does not match any of the other defined intents</a:t>
-            </a:r>
-          </a:p>
-          <a:p>
-            <a:pPr lvl="2"/>
-            <a:r>
-              <a:rPr lang="en-US" dirty="0"/>
-              <a:t>“Sorry I don’t know that one”</a:t>
-            </a:r>
-          </a:p>
-          <a:p>
-            <a:pPr lvl="1"/>
-            <a:r>
-              <a:rPr lang="en-US" dirty="0" err="1"/>
-              <a:t>AMAZON.StopIntent</a:t>
-            </a:r>
-            <a:endParaRPr lang="en-US" dirty="0"/>
-          </a:p>
-          <a:p>
-            <a:pPr lvl="2"/>
-            <a:r>
-              <a:rPr lang="en-US" dirty="0"/>
-              <a:t>Invoked when user wants to stop an open session</a:t>
-            </a:r>
-          </a:p>
-          <a:p>
-            <a:pPr lvl="1"/>
-            <a:endParaRPr lang="en-US" dirty="0"/>
+              <a:rPr lang="en-US" dirty="0"/>
+              <a:t>“Alexa, ask ESPN for the score of the Viking game.”</a:t>
+            </a:r>
           </a:p>
         </p:txBody>
       </p:sp>
     </p:spTree>
     <p:extLst>
       <p:ext uri="{BB962C8B-B14F-4D97-AF65-F5344CB8AC3E}">
-        <p14:creationId xmlns:p14="http://schemas.microsoft.com/office/powerpoint/2010/main" val="2912906413"/>
+        <p14:creationId xmlns:p14="http://schemas.microsoft.com/office/powerpoint/2010/main" val="1225673664"/>
       </p:ext>
     </p:extLst>
   </p:cSld>
@@ -4416,7 +4544,7 @@
           <p:cNvPr id="2" name="Title 1">
             <a:extLst>
               <a:ext uri="{FF2B5EF4-FFF2-40B4-BE49-F238E27FC236}">
-                <a16:creationId xmlns:a16="http://schemas.microsoft.com/office/drawing/2014/main" id="{B6F7ED87-B603-4555-AFBC-8609F81C5D59}"/>
+                <a16:creationId xmlns:a16="http://schemas.microsoft.com/office/drawing/2014/main" id="{A1BD2057-6022-4829-87F9-368062B452E3}"/>
               </a:ext>
             </a:extLst>
           </p:cNvPr>
@@ -4444,7 +4572,7 @@
           <p:cNvPr id="3" name="Content Placeholder 2">
             <a:extLst>
               <a:ext uri="{FF2B5EF4-FFF2-40B4-BE49-F238E27FC236}">
-                <a16:creationId xmlns:a16="http://schemas.microsoft.com/office/drawing/2014/main" id="{0E8108C6-4BA9-47EC-8022-66621475A00D}"/>
+                <a16:creationId xmlns:a16="http://schemas.microsoft.com/office/drawing/2014/main" id="{8A626891-DEE4-4575-B99B-D230647CBC80}"/>
               </a:ext>
             </a:extLst>
           </p:cNvPr>
@@ -4462,53 +4590,93 @@
           <a:p>
             <a:r>
               <a:rPr lang="en-US" dirty="0"/>
-              <a:t>User-defined intents</a:t>
+              <a:t>Built-In Intents</a:t>
             </a:r>
           </a:p>
           <a:p>
             <a:pPr lvl="1"/>
             <a:r>
-              <a:rPr lang="en-US" dirty="0"/>
-              <a:t>Makes your custom skill unique</a:t>
+              <a:rPr lang="en-US" dirty="0" err="1"/>
+              <a:t>AMAZON.CancelIntent</a:t>
+            </a:r>
+            <a:endParaRPr lang="en-US" dirty="0"/>
+          </a:p>
+          <a:p>
+            <a:pPr lvl="2"/>
+            <a:r>
+              <a:rPr lang="en-US" dirty="0"/>
+              <a:t>Invoked when user interrupts current intent by saying “Alexa Cancel”</a:t>
             </a:r>
           </a:p>
           <a:p>
             <a:pPr lvl="1"/>
             <a:r>
-              <a:rPr lang="en-US" dirty="0"/>
-              <a:t>“Alexa ask ESPN for the score of the Viking game”</a:t>
+              <a:rPr lang="en-US" dirty="0" err="1"/>
+              <a:t>AMAZON.HelpIntent</a:t>
+            </a:r>
+            <a:endParaRPr lang="en-US" dirty="0"/>
+          </a:p>
+          <a:p>
+            <a:pPr lvl="2"/>
+            <a:r>
+              <a:rPr lang="en-US" dirty="0"/>
+              <a:t>Invoked when user needs help with what to do within a custom skill</a:t>
+            </a:r>
+          </a:p>
+          <a:p>
+            <a:pPr lvl="2"/>
+            <a:r>
+              <a:rPr lang="en-US" dirty="0"/>
+              <a:t>Provides sample commands</a:t>
             </a:r>
           </a:p>
           <a:p>
             <a:pPr lvl="1"/>
             <a:r>
-              <a:rPr lang="en-US" dirty="0"/>
-              <a:t>“Alexa ask Google for the top trends”</a:t>
-            </a:r>
-          </a:p>
-          <a:p>
-            <a:r>
-              <a:rPr lang="en-US" dirty="0"/>
-              <a:t>Made up of </a:t>
-            </a:r>
-            <a:r>
-              <a:rPr lang="en-US" b="1" dirty="0"/>
-              <a:t>Utterances</a:t>
+              <a:rPr lang="en-US" dirty="0" err="1"/>
+              <a:t>AMAZON.FallbackIntent</a:t>
+            </a:r>
+            <a:endParaRPr lang="en-US" dirty="0"/>
+          </a:p>
+          <a:p>
+            <a:pPr lvl="2"/>
+            <a:r>
+              <a:rPr lang="en-US" dirty="0"/>
+              <a:t>Invoked when user’s command does not match any of the other defined intents</a:t>
+            </a:r>
+          </a:p>
+          <a:p>
+            <a:pPr lvl="2"/>
+            <a:r>
+              <a:rPr lang="en-US" dirty="0"/>
+              <a:t>“Sorry I don’t know that one”</a:t>
             </a:r>
           </a:p>
           <a:p>
             <a:pPr lvl="1"/>
             <a:r>
-              <a:rPr lang="en-US" dirty="0"/>
-              <a:t>Utterances – phases the user might say</a:t>
-            </a:r>
+              <a:rPr lang="en-US" dirty="0" err="1"/>
+              <a:t>AMAZON.StopIntent</a:t>
+            </a:r>
+            <a:endParaRPr lang="en-US" dirty="0"/>
+          </a:p>
+          <a:p>
+            <a:pPr lvl="2"/>
+            <a:r>
+              <a:rPr lang="en-US" dirty="0"/>
+              <a:t>Invoked when user wants to stop an open session</a:t>
+            </a:r>
+          </a:p>
+          <a:p>
+            <a:pPr lvl="1"/>
+            <a:endParaRPr lang="en-US" dirty="0"/>
           </a:p>
         </p:txBody>
       </p:sp>
     </p:spTree>
     <p:extLst>
       <p:ext uri="{BB962C8B-B14F-4D97-AF65-F5344CB8AC3E}">
-        <p14:creationId xmlns:p14="http://schemas.microsoft.com/office/powerpoint/2010/main" val="2608405855"/>
+        <p14:creationId xmlns:p14="http://schemas.microsoft.com/office/powerpoint/2010/main" val="2912906413"/>
       </p:ext>
     </p:extLst>
   </p:cSld>
@@ -4540,7 +4708,7 @@
           <p:cNvPr id="2" name="Title 1">
             <a:extLst>
               <a:ext uri="{FF2B5EF4-FFF2-40B4-BE49-F238E27FC236}">
-                <a16:creationId xmlns:a16="http://schemas.microsoft.com/office/drawing/2014/main" id="{D23C619C-88CC-4D75-8EEA-13B6B4E0AB85}"/>
+                <a16:creationId xmlns:a16="http://schemas.microsoft.com/office/drawing/2014/main" id="{B6F7ED87-B603-4555-AFBC-8609F81C5D59}"/>
               </a:ext>
             </a:extLst>
           </p:cNvPr>
@@ -4558,7 +4726,7 @@
           <a:p>
             <a:r>
               <a:rPr lang="en-US" dirty="0"/>
-              <a:t>Slot Types</a:t>
+              <a:t>Intents</a:t>
             </a:r>
           </a:p>
         </p:txBody>
@@ -4568,7 +4736,7 @@
           <p:cNvPr id="3" name="Content Placeholder 2">
             <a:extLst>
               <a:ext uri="{FF2B5EF4-FFF2-40B4-BE49-F238E27FC236}">
-                <a16:creationId xmlns:a16="http://schemas.microsoft.com/office/drawing/2014/main" id="{7F5E6E1A-1276-4DCA-800F-1A049EADC4D7}"/>
+                <a16:creationId xmlns:a16="http://schemas.microsoft.com/office/drawing/2014/main" id="{0E8108C6-4BA9-47EC-8022-66621475A00D}"/>
               </a:ext>
             </a:extLst>
           </p:cNvPr>
@@ -4581,60 +4749,50 @@
         </p:nvSpPr>
         <p:spPr/>
         <p:txBody>
-          <a:bodyPr>
-            <a:normAutofit/>
-          </a:bodyPr>
-          <a:lstStyle/>
-          <a:p>
-            <a:r>
-              <a:rPr lang="en-US" dirty="0"/>
-              <a:t>Variables within a utterance</a:t>
-            </a:r>
-          </a:p>
-          <a:p>
-            <a:r>
-              <a:rPr lang="en-US" dirty="0"/>
-              <a:t>Utterances can have multiple slots</a:t>
-            </a:r>
-          </a:p>
-          <a:p>
-            <a:r>
-              <a:rPr lang="en-US" dirty="0"/>
-              <a:t>User: “Alexa ask ESPN what the score of the Minnesota Viking football game.”</a:t>
-            </a:r>
-          </a:p>
-          <a:p>
-            <a:r>
-              <a:rPr lang="en-US" dirty="0"/>
-              <a:t>User: “Alexa ask ESPN what the score of the {team name} {sport name} game.”</a:t>
+          <a:bodyPr/>
+          <a:lstStyle/>
+          <a:p>
+            <a:r>
+              <a:rPr lang="en-US" dirty="0"/>
+              <a:t>User-defined intents</a:t>
             </a:r>
           </a:p>
           <a:p>
             <a:pPr lvl="1"/>
             <a:r>
               <a:rPr lang="en-US" dirty="0"/>
-              <a:t>{team name}</a:t>
-            </a:r>
-          </a:p>
-          <a:p>
-            <a:pPr lvl="2"/>
-            <a:r>
-              <a:rPr lang="en-US" dirty="0"/>
-              <a:t>Minnesota Vikings, Green Bay Packers</a:t>
+              <a:t>Makes your custom skill unique</a:t>
             </a:r>
           </a:p>
           <a:p>
             <a:pPr lvl="1"/>
             <a:r>
               <a:rPr lang="en-US" dirty="0"/>
-              <a:t>{sport}</a:t>
-            </a:r>
-          </a:p>
-          <a:p>
-            <a:pPr lvl="2"/>
-            <a:r>
-              <a:rPr lang="en-US" dirty="0"/>
-              <a:t>Football, hockey, baseball</a:t>
+              <a:t>“Alexa ask ESPN for the score of the Viking game”</a:t>
+            </a:r>
+          </a:p>
+          <a:p>
+            <a:pPr lvl="1"/>
+            <a:r>
+              <a:rPr lang="en-US" dirty="0"/>
+              <a:t>“Alexa ask Google for the top trends”</a:t>
+            </a:r>
+          </a:p>
+          <a:p>
+            <a:r>
+              <a:rPr lang="en-US" dirty="0"/>
+              <a:t>Made up of </a:t>
+            </a:r>
+            <a:r>
+              <a:rPr lang="en-US" b="1" dirty="0"/>
+              <a:t>Utterances</a:t>
+            </a:r>
+          </a:p>
+          <a:p>
+            <a:pPr lvl="1"/>
+            <a:r>
+              <a:rPr lang="en-US" dirty="0"/>
+              <a:t>Utterances – phases the user might say</a:t>
             </a:r>
           </a:p>
         </p:txBody>
@@ -4642,7 +4800,7 @@
     </p:spTree>
     <p:extLst>
       <p:ext uri="{BB962C8B-B14F-4D97-AF65-F5344CB8AC3E}">
-        <p14:creationId xmlns:p14="http://schemas.microsoft.com/office/powerpoint/2010/main" val="4124802825"/>
+        <p14:creationId xmlns:p14="http://schemas.microsoft.com/office/powerpoint/2010/main" val="2608405855"/>
       </p:ext>
     </p:extLst>
   </p:cSld>
@@ -4674,7 +4832,7 @@
           <p:cNvPr id="2" name="Title 1">
             <a:extLst>
               <a:ext uri="{FF2B5EF4-FFF2-40B4-BE49-F238E27FC236}">
-                <a16:creationId xmlns:a16="http://schemas.microsoft.com/office/drawing/2014/main" id="{FA295848-902A-40FE-8F5B-47BADBA889DA}"/>
+                <a16:creationId xmlns:a16="http://schemas.microsoft.com/office/drawing/2014/main" id="{D23C619C-88CC-4D75-8EEA-13B6B4E0AB85}"/>
               </a:ext>
             </a:extLst>
           </p:cNvPr>
@@ -4692,7 +4850,7 @@
           <a:p>
             <a:r>
               <a:rPr lang="en-US" dirty="0"/>
-              <a:t>Interaction Types</a:t>
+              <a:t>Slot Types</a:t>
             </a:r>
           </a:p>
         </p:txBody>
@@ -4702,7 +4860,7 @@
           <p:cNvPr id="3" name="Content Placeholder 2">
             <a:extLst>
               <a:ext uri="{FF2B5EF4-FFF2-40B4-BE49-F238E27FC236}">
-                <a16:creationId xmlns:a16="http://schemas.microsoft.com/office/drawing/2014/main" id="{02DA7A9E-989D-4538-95D0-453B931B048D}"/>
+                <a16:creationId xmlns:a16="http://schemas.microsoft.com/office/drawing/2014/main" id="{7F5E6E1A-1276-4DCA-800F-1A049EADC4D7}"/>
               </a:ext>
             </a:extLst>
           </p:cNvPr>
@@ -4715,74 +4873,60 @@
         </p:nvSpPr>
         <p:spPr/>
         <p:txBody>
-          <a:bodyPr/>
-          <a:lstStyle/>
-          <a:p>
-            <a:r>
-              <a:rPr lang="en-US" dirty="0"/>
-              <a:t>Single Command</a:t>
+          <a:bodyPr>
+            <a:normAutofit/>
+          </a:bodyPr>
+          <a:lstStyle/>
+          <a:p>
+            <a:r>
+              <a:rPr lang="en-US" dirty="0"/>
+              <a:t>Variables within a utterance</a:t>
+            </a:r>
+          </a:p>
+          <a:p>
+            <a:r>
+              <a:rPr lang="en-US" dirty="0"/>
+              <a:t>Utterances can have multiple slots</a:t>
+            </a:r>
+          </a:p>
+          <a:p>
+            <a:r>
+              <a:rPr lang="en-US" dirty="0"/>
+              <a:t>User: “Alexa ask ESPN what the score of the Minnesota Viking football game.”</a:t>
+            </a:r>
+          </a:p>
+          <a:p>
+            <a:r>
+              <a:rPr lang="en-US" dirty="0"/>
+              <a:t>User: “Alexa ask ESPN what the score of the {team name} {sport name} game.”</a:t>
             </a:r>
           </a:p>
           <a:p>
             <a:pPr lvl="1"/>
             <a:r>
               <a:rPr lang="en-US" dirty="0"/>
-              <a:t>User: “Alexa ask ESPN for the score of the Viking game.”</a:t>
+              <a:t>{team name}</a:t>
             </a:r>
           </a:p>
           <a:p>
             <a:pPr lvl="2"/>
             <a:r>
               <a:rPr lang="en-US" dirty="0"/>
-              <a:t>Alexa: “The score of the Viking Packer game is 21-13, Vikings in the lead.”</a:t>
-            </a:r>
-          </a:p>
-          <a:p>
-            <a:r>
-              <a:rPr lang="en-US" dirty="0"/>
-              <a:t>Sessions</a:t>
+              <a:t>Minnesota Vikings, Green Bay Packers</a:t>
             </a:r>
           </a:p>
           <a:p>
             <a:pPr lvl="1"/>
             <a:r>
               <a:rPr lang="en-US" dirty="0"/>
-              <a:t>Do not require user to say invocation name every command</a:t>
-            </a:r>
-          </a:p>
-          <a:p>
-            <a:pPr lvl="1"/>
-            <a:r>
-              <a:rPr lang="en-US" dirty="0"/>
-              <a:t>User: “Alexa open ESPN”</a:t>
+              <a:t>{sport}</a:t>
             </a:r>
           </a:p>
           <a:p>
             <a:pPr lvl="2"/>
             <a:r>
               <a:rPr lang="en-US" dirty="0"/>
-              <a:t>Alexa ESPN skill: “Welcome to ESPN, how can I help you?”</a:t>
-            </a:r>
-          </a:p>
-          <a:p>
-            <a:pPr lvl="2"/>
-            <a:r>
-              <a:rPr lang="en-US" dirty="0"/>
-              <a:t>User: “How are Minnesota sports doing?”</a:t>
-            </a:r>
-          </a:p>
-          <a:p>
-            <a:pPr lvl="2"/>
-            <a:r>
-              <a:rPr lang="en-US" dirty="0"/>
-              <a:t>Alexa ESPN skill: “Minnesota Wild are have a record of 3-1-1 and the Twins have a record of 23-33.”</a:t>
-            </a:r>
-          </a:p>
-          <a:p>
-            <a:pPr lvl="2"/>
-            <a:r>
-              <a:rPr lang="en-US" dirty="0"/>
-              <a:t>…</a:t>
+              <a:t>Football, hockey, baseball</a:t>
             </a:r>
           </a:p>
         </p:txBody>
@@ -4790,7 +4934,7 @@
     </p:spTree>
     <p:extLst>
       <p:ext uri="{BB962C8B-B14F-4D97-AF65-F5344CB8AC3E}">
-        <p14:creationId xmlns:p14="http://schemas.microsoft.com/office/powerpoint/2010/main" val="1769388970"/>
+        <p14:creationId xmlns:p14="http://schemas.microsoft.com/office/powerpoint/2010/main" val="4124802825"/>
       </p:ext>
     </p:extLst>
   </p:cSld>

</xml_diff>

<commit_message>
added node js app
</commit_message>
<xml_diff>
--- a/Building An Custom.pptx
+++ b/Building An Custom.pptx
@@ -6,18 +6,19 @@
   </p:sldMasterIdLst>
   <p:sldIdLst>
     <p:sldId id="268" r:id="rId2"/>
-    <p:sldId id="269" r:id="rId3"/>
-    <p:sldId id="257" r:id="rId4"/>
-    <p:sldId id="259" r:id="rId5"/>
-    <p:sldId id="258" r:id="rId6"/>
-    <p:sldId id="260" r:id="rId7"/>
-    <p:sldId id="261" r:id="rId8"/>
-    <p:sldId id="262" r:id="rId9"/>
-    <p:sldId id="264" r:id="rId10"/>
-    <p:sldId id="263" r:id="rId11"/>
-    <p:sldId id="265" r:id="rId12"/>
-    <p:sldId id="266" r:id="rId13"/>
-    <p:sldId id="267" r:id="rId14"/>
+    <p:sldId id="270" r:id="rId3"/>
+    <p:sldId id="269" r:id="rId4"/>
+    <p:sldId id="257" r:id="rId5"/>
+    <p:sldId id="259" r:id="rId6"/>
+    <p:sldId id="258" r:id="rId7"/>
+    <p:sldId id="260" r:id="rId8"/>
+    <p:sldId id="261" r:id="rId9"/>
+    <p:sldId id="262" r:id="rId10"/>
+    <p:sldId id="264" r:id="rId11"/>
+    <p:sldId id="263" r:id="rId12"/>
+    <p:sldId id="265" r:id="rId13"/>
+    <p:sldId id="266" r:id="rId14"/>
+    <p:sldId id="267" r:id="rId15"/>
   </p:sldIdLst>
   <p:sldSz cx="12192000" cy="6858000"/>
   <p:notesSz cx="6858000" cy="9144000"/>
@@ -271,7 +272,7 @@
           <a:p>
             <a:fld id="{D41921DE-9A10-457F-BA6E-89142AAEB166}" type="datetimeFigureOut">
               <a:rPr lang="en-US" smtClean="0"/>
-              <a:t>10/29/2018</a:t>
+              <a:t>10/30/2018</a:t>
             </a:fld>
             <a:endParaRPr lang="en-US"/>
           </a:p>
@@ -469,7 +470,7 @@
           <a:p>
             <a:fld id="{D41921DE-9A10-457F-BA6E-89142AAEB166}" type="datetimeFigureOut">
               <a:rPr lang="en-US" smtClean="0"/>
-              <a:t>10/29/2018</a:t>
+              <a:t>10/30/2018</a:t>
             </a:fld>
             <a:endParaRPr lang="en-US"/>
           </a:p>
@@ -677,7 +678,7 @@
           <a:p>
             <a:fld id="{D41921DE-9A10-457F-BA6E-89142AAEB166}" type="datetimeFigureOut">
               <a:rPr lang="en-US" smtClean="0"/>
-              <a:t>10/29/2018</a:t>
+              <a:t>10/30/2018</a:t>
             </a:fld>
             <a:endParaRPr lang="en-US"/>
           </a:p>
@@ -875,7 +876,7 @@
           <a:p>
             <a:fld id="{D41921DE-9A10-457F-BA6E-89142AAEB166}" type="datetimeFigureOut">
               <a:rPr lang="en-US" smtClean="0"/>
-              <a:t>10/29/2018</a:t>
+              <a:t>10/30/2018</a:t>
             </a:fld>
             <a:endParaRPr lang="en-US"/>
           </a:p>
@@ -1150,7 +1151,7 @@
           <a:p>
             <a:fld id="{D41921DE-9A10-457F-BA6E-89142AAEB166}" type="datetimeFigureOut">
               <a:rPr lang="en-US" smtClean="0"/>
-              <a:t>10/29/2018</a:t>
+              <a:t>10/30/2018</a:t>
             </a:fld>
             <a:endParaRPr lang="en-US"/>
           </a:p>
@@ -1415,7 +1416,7 @@
           <a:p>
             <a:fld id="{D41921DE-9A10-457F-BA6E-89142AAEB166}" type="datetimeFigureOut">
               <a:rPr lang="en-US" smtClean="0"/>
-              <a:t>10/29/2018</a:t>
+              <a:t>10/30/2018</a:t>
             </a:fld>
             <a:endParaRPr lang="en-US"/>
           </a:p>
@@ -1827,7 +1828,7 @@
           <a:p>
             <a:fld id="{D41921DE-9A10-457F-BA6E-89142AAEB166}" type="datetimeFigureOut">
               <a:rPr lang="en-US" smtClean="0"/>
-              <a:t>10/29/2018</a:t>
+              <a:t>10/30/2018</a:t>
             </a:fld>
             <a:endParaRPr lang="en-US"/>
           </a:p>
@@ -1968,7 +1969,7 @@
           <a:p>
             <a:fld id="{D41921DE-9A10-457F-BA6E-89142AAEB166}" type="datetimeFigureOut">
               <a:rPr lang="en-US" smtClean="0"/>
-              <a:t>10/29/2018</a:t>
+              <a:t>10/30/2018</a:t>
             </a:fld>
             <a:endParaRPr lang="en-US"/>
           </a:p>
@@ -2081,7 +2082,7 @@
           <a:p>
             <a:fld id="{D41921DE-9A10-457F-BA6E-89142AAEB166}" type="datetimeFigureOut">
               <a:rPr lang="en-US" smtClean="0"/>
-              <a:t>10/29/2018</a:t>
+              <a:t>10/30/2018</a:t>
             </a:fld>
             <a:endParaRPr lang="en-US"/>
           </a:p>
@@ -2392,7 +2393,7 @@
           <a:p>
             <a:fld id="{D41921DE-9A10-457F-BA6E-89142AAEB166}" type="datetimeFigureOut">
               <a:rPr lang="en-US" smtClean="0"/>
-              <a:t>10/29/2018</a:t>
+              <a:t>10/30/2018</a:t>
             </a:fld>
             <a:endParaRPr lang="en-US"/>
           </a:p>
@@ -2680,7 +2681,7 @@
           <a:p>
             <a:fld id="{D41921DE-9A10-457F-BA6E-89142AAEB166}" type="datetimeFigureOut">
               <a:rPr lang="en-US" smtClean="0"/>
-              <a:t>10/29/2018</a:t>
+              <a:t>10/30/2018</a:t>
             </a:fld>
             <a:endParaRPr lang="en-US"/>
           </a:p>
@@ -2921,7 +2922,7 @@
           <a:p>
             <a:fld id="{D41921DE-9A10-457F-BA6E-89142AAEB166}" type="datetimeFigureOut">
               <a:rPr lang="en-US" smtClean="0"/>
-              <a:t>10/29/2018</a:t>
+              <a:t>10/30/2018</a:t>
             </a:fld>
             <a:endParaRPr lang="en-US"/>
           </a:p>
@@ -3436,7 +3437,7 @@
           <p:cNvPr id="2" name="Title 1">
             <a:extLst>
               <a:ext uri="{FF2B5EF4-FFF2-40B4-BE49-F238E27FC236}">
-                <a16:creationId xmlns:a16="http://schemas.microsoft.com/office/drawing/2014/main" id="{FA295848-902A-40FE-8F5B-47BADBA889DA}"/>
+                <a16:creationId xmlns:a16="http://schemas.microsoft.com/office/drawing/2014/main" id="{D23C619C-88CC-4D75-8EEA-13B6B4E0AB85}"/>
               </a:ext>
             </a:extLst>
           </p:cNvPr>
@@ -3454,7 +3455,7 @@
           <a:p>
             <a:r>
               <a:rPr lang="en-US" dirty="0"/>
-              <a:t>Interaction Types</a:t>
+              <a:t>Slot Types</a:t>
             </a:r>
           </a:p>
         </p:txBody>
@@ -3464,7 +3465,7 @@
           <p:cNvPr id="3" name="Content Placeholder 2">
             <a:extLst>
               <a:ext uri="{FF2B5EF4-FFF2-40B4-BE49-F238E27FC236}">
-                <a16:creationId xmlns:a16="http://schemas.microsoft.com/office/drawing/2014/main" id="{02DA7A9E-989D-4538-95D0-453B931B048D}"/>
+                <a16:creationId xmlns:a16="http://schemas.microsoft.com/office/drawing/2014/main" id="{7F5E6E1A-1276-4DCA-800F-1A049EADC4D7}"/>
               </a:ext>
             </a:extLst>
           </p:cNvPr>
@@ -3477,74 +3478,76 @@
         </p:nvSpPr>
         <p:spPr/>
         <p:txBody>
-          <a:bodyPr/>
-          <a:lstStyle/>
-          <a:p>
-            <a:r>
-              <a:rPr lang="en-US" dirty="0"/>
-              <a:t>Single Command</a:t>
+          <a:bodyPr>
+            <a:normAutofit/>
+          </a:bodyPr>
+          <a:lstStyle/>
+          <a:p>
+            <a:r>
+              <a:rPr lang="en-US" dirty="0"/>
+              <a:t>Variables within a utterance</a:t>
+            </a:r>
+          </a:p>
+          <a:p>
+            <a:r>
+              <a:rPr lang="en-US" dirty="0"/>
+              <a:t>Utterances can have multiple slots</a:t>
+            </a:r>
+          </a:p>
+          <a:p>
+            <a:r>
+              <a:rPr lang="en-US" dirty="0"/>
+              <a:t>User: “Alexa ask ESPN what the score of the </a:t>
+            </a:r>
+            <a:r>
+              <a:rPr lang="en-US" b="1" dirty="0"/>
+              <a:t>Minnesota Viking</a:t>
+            </a:r>
+            <a:r>
+              <a:rPr lang="en-US" dirty="0"/>
+              <a:t> </a:t>
+            </a:r>
+            <a:r>
+              <a:rPr lang="en-US" b="1" dirty="0"/>
+              <a:t>football </a:t>
+            </a:r>
+            <a:r>
+              <a:rPr lang="en-US" dirty="0"/>
+              <a:t>game.”</a:t>
+            </a:r>
+          </a:p>
+          <a:p>
+            <a:r>
+              <a:rPr lang="en-US" dirty="0"/>
+              <a:t>User: “Alexa ask ESPN what the score of the {team name} {sport name} game.”</a:t>
             </a:r>
           </a:p>
           <a:p>
             <a:pPr lvl="1"/>
             <a:r>
               <a:rPr lang="en-US" dirty="0"/>
-              <a:t>User: “Alexa ask ESPN for the score of the Viking game.”</a:t>
+              <a:t>{team name}</a:t>
             </a:r>
           </a:p>
           <a:p>
             <a:pPr lvl="2"/>
             <a:r>
               <a:rPr lang="en-US" dirty="0"/>
-              <a:t>Alexa: “The score of the Viking Packer game is 21-13, Vikings in the lead.”</a:t>
-            </a:r>
-          </a:p>
-          <a:p>
-            <a:r>
-              <a:rPr lang="en-US" dirty="0"/>
-              <a:t>Sessions</a:t>
+              <a:t>Minnesota Vikings, Green Bay Packers, Minnesota Wild</a:t>
             </a:r>
           </a:p>
           <a:p>
             <a:pPr lvl="1"/>
             <a:r>
               <a:rPr lang="en-US" dirty="0"/>
-              <a:t>Do not require user to say invocation name every command</a:t>
-            </a:r>
-          </a:p>
-          <a:p>
-            <a:pPr lvl="1"/>
-            <a:r>
-              <a:rPr lang="en-US" dirty="0"/>
-              <a:t>User: “Alexa open ESPN”</a:t>
+              <a:t>{sport}</a:t>
             </a:r>
           </a:p>
           <a:p>
             <a:pPr lvl="2"/>
             <a:r>
               <a:rPr lang="en-US" dirty="0"/>
-              <a:t>Alexa ESPN skill: “Welcome to ESPN, how can I help you?”</a:t>
-            </a:r>
-          </a:p>
-          <a:p>
-            <a:pPr lvl="2"/>
-            <a:r>
-              <a:rPr lang="en-US" dirty="0"/>
-              <a:t>User: “How are Minnesota sports doing?”</a:t>
-            </a:r>
-          </a:p>
-          <a:p>
-            <a:pPr lvl="2"/>
-            <a:r>
-              <a:rPr lang="en-US" dirty="0"/>
-              <a:t>Alexa ESPN skill: “Minnesota Wild are have a record of 3-1-1 and the Twins have a record of 23-33.”</a:t>
-            </a:r>
-          </a:p>
-          <a:p>
-            <a:pPr lvl="2"/>
-            <a:r>
-              <a:rPr lang="en-US" dirty="0"/>
-              <a:t>…</a:t>
+              <a:t>Football, hockey, baseball</a:t>
             </a:r>
           </a:p>
         </p:txBody>
@@ -3552,7 +3555,7 @@
     </p:spTree>
     <p:extLst>
       <p:ext uri="{BB962C8B-B14F-4D97-AF65-F5344CB8AC3E}">
-        <p14:creationId xmlns:p14="http://schemas.microsoft.com/office/powerpoint/2010/main" val="1769388970"/>
+        <p14:creationId xmlns:p14="http://schemas.microsoft.com/office/powerpoint/2010/main" val="4124802825"/>
       </p:ext>
     </p:extLst>
   </p:cSld>
@@ -3584,7 +3587,7 @@
           <p:cNvPr id="2" name="Title 1">
             <a:extLst>
               <a:ext uri="{FF2B5EF4-FFF2-40B4-BE49-F238E27FC236}">
-                <a16:creationId xmlns:a16="http://schemas.microsoft.com/office/drawing/2014/main" id="{F4E9973C-D474-42E9-AFBF-F9FEF0565B55}"/>
+                <a16:creationId xmlns:a16="http://schemas.microsoft.com/office/drawing/2014/main" id="{FA295848-902A-40FE-8F5B-47BADBA889DA}"/>
               </a:ext>
             </a:extLst>
           </p:cNvPr>
@@ -3602,7 +3605,7 @@
           <a:p>
             <a:r>
               <a:rPr lang="en-US" dirty="0"/>
-              <a:t>Let’s Build One!</a:t>
+              <a:t>Interaction Types</a:t>
             </a:r>
           </a:p>
         </p:txBody>
@@ -3612,7 +3615,7 @@
           <p:cNvPr id="3" name="Content Placeholder 2">
             <a:extLst>
               <a:ext uri="{FF2B5EF4-FFF2-40B4-BE49-F238E27FC236}">
-                <a16:creationId xmlns:a16="http://schemas.microsoft.com/office/drawing/2014/main" id="{7A4ECB46-429B-4553-B530-02602B503A56}"/>
+                <a16:creationId xmlns:a16="http://schemas.microsoft.com/office/drawing/2014/main" id="{02DA7A9E-989D-4538-95D0-453B931B048D}"/>
               </a:ext>
             </a:extLst>
           </p:cNvPr>
@@ -3630,47 +3633,69 @@
           <a:p>
             <a:r>
               <a:rPr lang="en-US" dirty="0"/>
-              <a:t>Stocks</a:t>
-            </a:r>
-          </a:p>
-          <a:p>
-            <a:r>
-              <a:rPr lang="en-US" dirty="0"/>
-              <a:t>Sample Intents:</a:t>
+              <a:t>Single Command</a:t>
             </a:r>
           </a:p>
           <a:p>
             <a:pPr lvl="1"/>
             <a:r>
               <a:rPr lang="en-US" dirty="0"/>
-              <a:t>“What is the price of Apple’s stock?”</a:t>
+              <a:t>User: “Alexa ask ESPN for the score of the Viking game.”</a:t>
+            </a:r>
+          </a:p>
+          <a:p>
+            <a:pPr lvl="2"/>
+            <a:r>
+              <a:rPr lang="en-US" dirty="0"/>
+              <a:t>Alexa: “The score of the Viking Packer game is 21-13, Vikings in the lead.”</a:t>
+            </a:r>
+          </a:p>
+          <a:p>
+            <a:r>
+              <a:rPr lang="en-US" dirty="0"/>
+              <a:t>Sessions</a:t>
             </a:r>
           </a:p>
           <a:p>
             <a:pPr lvl="1"/>
             <a:r>
               <a:rPr lang="en-US" dirty="0"/>
-              <a:t>“Who is the CEO of Tesla?”</a:t>
+              <a:t>Do not require user to say invocation name for every command</a:t>
             </a:r>
           </a:p>
           <a:p>
             <a:pPr lvl="1"/>
             <a:r>
               <a:rPr lang="en-US" dirty="0"/>
-              <a:t>“What industry is Tesla in?”</a:t>
-            </a:r>
-          </a:p>
-          <a:p>
-            <a:r>
-              <a:rPr lang="en-US" dirty="0"/>
-              <a:t>Give Alexa a memory</a:t>
-            </a:r>
-          </a:p>
-          <a:p>
-            <a:pPr lvl="1"/>
-            <a:r>
-              <a:rPr lang="en-US" dirty="0"/>
-              <a:t>User will not need to say company name each time</a:t>
+              <a:t>User: “Alexa open ESPN”</a:t>
+            </a:r>
+          </a:p>
+          <a:p>
+            <a:pPr lvl="2"/>
+            <a:r>
+              <a:rPr lang="en-US" dirty="0"/>
+              <a:t>Alexa ESPN skill: “Welcome to ESPN, how can I help you?”</a:t>
+            </a:r>
+          </a:p>
+          <a:p>
+            <a:pPr lvl="2"/>
+            <a:r>
+              <a:rPr lang="en-US" dirty="0"/>
+              <a:t>User: “How are Minnesota sports doing?”</a:t>
+            </a:r>
+          </a:p>
+          <a:p>
+            <a:pPr lvl="2"/>
+            <a:r>
+              <a:rPr lang="en-US" dirty="0"/>
+              <a:t>Alexa ESPN skill: “Minnesota Wild are have a record of 3-1-1 and the Twins have a record of 23-33.”</a:t>
+            </a:r>
+          </a:p>
+          <a:p>
+            <a:pPr lvl="2"/>
+            <a:r>
+              <a:rPr lang="en-US" dirty="0"/>
+              <a:t>…</a:t>
             </a:r>
           </a:p>
         </p:txBody>
@@ -3678,7 +3703,7 @@
     </p:spTree>
     <p:extLst>
       <p:ext uri="{BB962C8B-B14F-4D97-AF65-F5344CB8AC3E}">
-        <p14:creationId xmlns:p14="http://schemas.microsoft.com/office/powerpoint/2010/main" val="4221358634"/>
+        <p14:creationId xmlns:p14="http://schemas.microsoft.com/office/powerpoint/2010/main" val="1769388970"/>
       </p:ext>
     </p:extLst>
   </p:cSld>
@@ -3710,6 +3735,139 @@
           <p:cNvPr id="2" name="Title 1">
             <a:extLst>
               <a:ext uri="{FF2B5EF4-FFF2-40B4-BE49-F238E27FC236}">
+                <a16:creationId xmlns:a16="http://schemas.microsoft.com/office/drawing/2014/main" id="{F4E9973C-D474-42E9-AFBF-F9FEF0565B55}"/>
+              </a:ext>
+            </a:extLst>
+          </p:cNvPr>
+          <p:cNvSpPr>
+            <a:spLocks noGrp="1"/>
+          </p:cNvSpPr>
+          <p:nvPr>
+            <p:ph type="title"/>
+          </p:nvPr>
+        </p:nvSpPr>
+        <p:spPr/>
+        <p:txBody>
+          <a:bodyPr/>
+          <a:lstStyle/>
+          <a:p>
+            <a:r>
+              <a:rPr lang="en-US" dirty="0"/>
+              <a:t>Let’s Build One!</a:t>
+            </a:r>
+          </a:p>
+        </p:txBody>
+      </p:sp>
+      <p:sp>
+        <p:nvSpPr>
+          <p:cNvPr id="3" name="Content Placeholder 2">
+            <a:extLst>
+              <a:ext uri="{FF2B5EF4-FFF2-40B4-BE49-F238E27FC236}">
+                <a16:creationId xmlns:a16="http://schemas.microsoft.com/office/drawing/2014/main" id="{7A4ECB46-429B-4553-B530-02602B503A56}"/>
+              </a:ext>
+            </a:extLst>
+          </p:cNvPr>
+          <p:cNvSpPr>
+            <a:spLocks noGrp="1"/>
+          </p:cNvSpPr>
+          <p:nvPr>
+            <p:ph idx="1"/>
+          </p:nvPr>
+        </p:nvSpPr>
+        <p:spPr/>
+        <p:txBody>
+          <a:bodyPr/>
+          <a:lstStyle/>
+          <a:p>
+            <a:r>
+              <a:rPr lang="en-US" dirty="0"/>
+              <a:t>Stocks</a:t>
+            </a:r>
+          </a:p>
+          <a:p>
+            <a:r>
+              <a:rPr lang="en-US" dirty="0"/>
+              <a:t>Sample Intents:</a:t>
+            </a:r>
+          </a:p>
+          <a:p>
+            <a:pPr lvl="1"/>
+            <a:r>
+              <a:rPr lang="en-US" dirty="0"/>
+              <a:t>“What is the price of Apple’s stock?”</a:t>
+            </a:r>
+          </a:p>
+          <a:p>
+            <a:pPr lvl="1"/>
+            <a:r>
+              <a:rPr lang="en-US" dirty="0"/>
+              <a:t>“Who is the CEO of Tesla?”</a:t>
+            </a:r>
+          </a:p>
+          <a:p>
+            <a:pPr lvl="1"/>
+            <a:r>
+              <a:rPr lang="en-US" dirty="0"/>
+              <a:t>“What industry is Tesla in?”</a:t>
+            </a:r>
+          </a:p>
+          <a:p>
+            <a:r>
+              <a:rPr lang="en-US" dirty="0"/>
+              <a:t>Give Alexa a memory</a:t>
+            </a:r>
+          </a:p>
+          <a:p>
+            <a:pPr lvl="1"/>
+            <a:r>
+              <a:rPr lang="en-US" dirty="0"/>
+              <a:t>User will not need to say company name each time</a:t>
+            </a:r>
+          </a:p>
+          <a:p>
+            <a:pPr lvl="2"/>
+            <a:r>
+              <a:rPr lang="en-US" dirty="0"/>
+              <a:t>“Who is the CEO?”</a:t>
+            </a:r>
+          </a:p>
+        </p:txBody>
+      </p:sp>
+    </p:spTree>
+    <p:extLst>
+      <p:ext uri="{BB962C8B-B14F-4D97-AF65-F5344CB8AC3E}">
+        <p14:creationId xmlns:p14="http://schemas.microsoft.com/office/powerpoint/2010/main" val="4221358634"/>
+      </p:ext>
+    </p:extLst>
+  </p:cSld>
+  <p:clrMapOvr>
+    <a:masterClrMapping/>
+  </p:clrMapOvr>
+</p:sld>
+</file>
+
+<file path=ppt/slides/slide13.xml><?xml version="1.0" encoding="utf-8"?>
+<p:sld xmlns:a="http://schemas.openxmlformats.org/drawingml/2006/main" xmlns:r="http://schemas.openxmlformats.org/officeDocument/2006/relationships" xmlns:p="http://schemas.openxmlformats.org/presentationml/2006/main">
+  <p:cSld>
+    <p:spTree>
+      <p:nvGrpSpPr>
+        <p:cNvPr id="1" name=""/>
+        <p:cNvGrpSpPr/>
+        <p:nvPr/>
+      </p:nvGrpSpPr>
+      <p:grpSpPr>
+        <a:xfrm>
+          <a:off x="0" y="0"/>
+          <a:ext cx="0" cy="0"/>
+          <a:chOff x="0" y="0"/>
+          <a:chExt cx="0" cy="0"/>
+        </a:xfrm>
+      </p:grpSpPr>
+      <p:sp>
+        <p:nvSpPr>
+          <p:cNvPr id="2" name="Title 1">
+            <a:extLst>
+              <a:ext uri="{FF2B5EF4-FFF2-40B4-BE49-F238E27FC236}">
                 <a16:creationId xmlns:a16="http://schemas.microsoft.com/office/drawing/2014/main" id="{7BE69B2F-4DE4-4FBD-BB64-CEDCB6DB66E7}"/>
               </a:ext>
             </a:extLst>
@@ -3804,7 +3962,7 @@
             <a:pPr lvl="1"/>
             <a:r>
               <a:rPr lang="en-US" dirty="0"/>
-              <a:t>Giving your skill memory</a:t>
+              <a:t>Giving your skill persistent memory</a:t>
             </a:r>
           </a:p>
           <a:p>
@@ -3829,7 +3987,7 @@
 </p:sld>
 </file>
 
-<file path=ppt/slides/slide13.xml><?xml version="1.0" encoding="utf-8"?>
+<file path=ppt/slides/slide14.xml><?xml version="1.0" encoding="utf-8"?>
 <p:sld xmlns:a="http://schemas.openxmlformats.org/drawingml/2006/main" xmlns:r="http://schemas.openxmlformats.org/officeDocument/2006/relationships" xmlns:p="http://schemas.openxmlformats.org/presentationml/2006/main">
   <p:cSld>
     <p:spTree>
@@ -3975,7 +4133,7 @@
           <p:cNvPr id="2" name="Title 1">
             <a:extLst>
               <a:ext uri="{FF2B5EF4-FFF2-40B4-BE49-F238E27FC236}">
-                <a16:creationId xmlns:a16="http://schemas.microsoft.com/office/drawing/2014/main" id="{613835D5-69E2-4D87-97C5-6A185B0E0850}"/>
+                <a16:creationId xmlns:a16="http://schemas.microsoft.com/office/drawing/2014/main" id="{882CAE58-046B-45C8-9646-CF5841C4BF8D}"/>
               </a:ext>
             </a:extLst>
           </p:cNvPr>
@@ -4003,7 +4161,7 @@
           <p:cNvPr id="3" name="Content Placeholder 2">
             <a:extLst>
               <a:ext uri="{FF2B5EF4-FFF2-40B4-BE49-F238E27FC236}">
-                <a16:creationId xmlns:a16="http://schemas.microsoft.com/office/drawing/2014/main" id="{00AF2883-D1F8-4BB4-837C-9EEB588A9BAA}"/>
+                <a16:creationId xmlns:a16="http://schemas.microsoft.com/office/drawing/2014/main" id="{F99AC049-9C85-4169-8D06-F165BF498F19}"/>
               </a:ext>
             </a:extLst>
           </p:cNvPr>
@@ -4019,32 +4177,14 @@
           <a:bodyPr/>
           <a:lstStyle/>
           <a:p>
-            <a:r>
-              <a:rPr lang="en-US" dirty="0"/>
-              <a:t>Software Engineer </a:t>
-            </a:r>
-          </a:p>
-          <a:p>
-            <a:r>
-              <a:rPr lang="en-US" dirty="0"/>
-              <a:t>Currently working at C.H. Robinson from 9-5</a:t>
-            </a:r>
-          </a:p>
-          <a:p>
-            <a:r>
-              <a:rPr lang="en-US" dirty="0"/>
-              <a:t>I build cool software on the side</a:t>
-            </a:r>
-          </a:p>
-          <a:p>
-            <a:endParaRPr lang="en-US" dirty="0"/>
+            <a:endParaRPr lang="en-US"/>
           </a:p>
         </p:txBody>
       </p:sp>
     </p:spTree>
     <p:extLst>
       <p:ext uri="{BB962C8B-B14F-4D97-AF65-F5344CB8AC3E}">
-        <p14:creationId xmlns:p14="http://schemas.microsoft.com/office/powerpoint/2010/main" val="504703730"/>
+        <p14:creationId xmlns:p14="http://schemas.microsoft.com/office/powerpoint/2010/main" val="3012193843"/>
       </p:ext>
     </p:extLst>
   </p:cSld>
@@ -4076,7 +4216,7 @@
           <p:cNvPr id="2" name="Title 1">
             <a:extLst>
               <a:ext uri="{FF2B5EF4-FFF2-40B4-BE49-F238E27FC236}">
-                <a16:creationId xmlns:a16="http://schemas.microsoft.com/office/drawing/2014/main" id="{D8CFACD9-252B-464F-8ECC-0FBD04808441}"/>
+                <a16:creationId xmlns:a16="http://schemas.microsoft.com/office/drawing/2014/main" id="{613835D5-69E2-4D87-97C5-6A185B0E0850}"/>
               </a:ext>
             </a:extLst>
           </p:cNvPr>
@@ -4094,7 +4234,7 @@
           <a:p>
             <a:r>
               <a:rPr lang="en-US" dirty="0"/>
-              <a:t>Overview for Today</a:t>
+              <a:t>Who Am I?</a:t>
             </a:r>
           </a:p>
         </p:txBody>
@@ -4104,7 +4244,7 @@
           <p:cNvPr id="3" name="Content Placeholder 2">
             <a:extLst>
               <a:ext uri="{FF2B5EF4-FFF2-40B4-BE49-F238E27FC236}">
-                <a16:creationId xmlns:a16="http://schemas.microsoft.com/office/drawing/2014/main" id="{6F116386-D81D-4B46-B7E5-741EC6D29952}"/>
+                <a16:creationId xmlns:a16="http://schemas.microsoft.com/office/drawing/2014/main" id="{00AF2883-D1F8-4BB4-837C-9EEB588A9BAA}"/>
               </a:ext>
             </a:extLst>
           </p:cNvPr>
@@ -4122,51 +4262,22 @@
           <a:p>
             <a:r>
               <a:rPr lang="en-US" dirty="0"/>
-              <a:t>Implementing, Deploying Custom Alexa Skill</a:t>
-            </a:r>
-          </a:p>
-          <a:p>
-            <a:pPr lvl="1"/>
-            <a:r>
-              <a:rPr lang="en-US" dirty="0"/>
-              <a:t>Alexa Skills Kit Command Line Interface (ASK CLI)</a:t>
-            </a:r>
-          </a:p>
-          <a:p>
-            <a:pPr lvl="1"/>
-            <a:r>
-              <a:rPr lang="en-US" dirty="0"/>
-              <a:t>AWS Lambda</a:t>
-            </a:r>
-          </a:p>
-          <a:p>
-            <a:pPr lvl="1"/>
-            <a:r>
-              <a:rPr lang="en-US" dirty="0"/>
-              <a:t>Node.js</a:t>
-            </a:r>
-          </a:p>
-          <a:p>
-            <a:r>
-              <a:rPr lang="en-US" dirty="0"/>
-              <a:t>How to consume a public API</a:t>
-            </a:r>
-          </a:p>
-          <a:p>
-            <a:pPr lvl="1"/>
-            <a:r>
-              <a:rPr lang="en-US" dirty="0"/>
-              <a:t>IEX Trading API</a:t>
-            </a:r>
-          </a:p>
-          <a:p>
-            <a:pPr lvl="2"/>
-            <a:r>
-              <a:rPr lang="en-US" dirty="0">
-                <a:hlinkClick r:id="rId2"/>
-              </a:rPr>
-              <a:t>https://iextrading.com/developer/docs/#getting-started</a:t>
-            </a:r>
+              <a:t>Software Engineer </a:t>
+            </a:r>
+          </a:p>
+          <a:p>
+            <a:r>
+              <a:rPr lang="en-US" dirty="0"/>
+              <a:t>Currently working at C.H. Robinson from 9-5</a:t>
+            </a:r>
+          </a:p>
+          <a:p>
+            <a:r>
+              <a:rPr lang="en-US" dirty="0"/>
+              <a:t>I build cool software on the side and mentor aspiring software engineers</a:t>
+            </a:r>
+          </a:p>
+          <a:p>
             <a:endParaRPr lang="en-US" dirty="0"/>
           </a:p>
         </p:txBody>
@@ -4174,7 +4285,7 @@
     </p:spTree>
     <p:extLst>
       <p:ext uri="{BB962C8B-B14F-4D97-AF65-F5344CB8AC3E}">
-        <p14:creationId xmlns:p14="http://schemas.microsoft.com/office/powerpoint/2010/main" val="3985130253"/>
+        <p14:creationId xmlns:p14="http://schemas.microsoft.com/office/powerpoint/2010/main" val="504703730"/>
       </p:ext>
     </p:extLst>
   </p:cSld>
@@ -4206,7 +4317,7 @@
           <p:cNvPr id="2" name="Title 1">
             <a:extLst>
               <a:ext uri="{FF2B5EF4-FFF2-40B4-BE49-F238E27FC236}">
-                <a16:creationId xmlns:a16="http://schemas.microsoft.com/office/drawing/2014/main" id="{AAF68D47-6D31-43EF-A9AA-C275631E2842}"/>
+                <a16:creationId xmlns:a16="http://schemas.microsoft.com/office/drawing/2014/main" id="{D8CFACD9-252B-464F-8ECC-0FBD04808441}"/>
               </a:ext>
             </a:extLst>
           </p:cNvPr>
@@ -4224,7 +4335,7 @@
           <a:p>
             <a:r>
               <a:rPr lang="en-US" dirty="0"/>
-              <a:t>What Makes a Skill?</a:t>
+              <a:t>Overview for Today</a:t>
             </a:r>
           </a:p>
         </p:txBody>
@@ -4234,7 +4345,7 @@
           <p:cNvPr id="3" name="Content Placeholder 2">
             <a:extLst>
               <a:ext uri="{FF2B5EF4-FFF2-40B4-BE49-F238E27FC236}">
-                <a16:creationId xmlns:a16="http://schemas.microsoft.com/office/drawing/2014/main" id="{CE4643B2-1E5E-43B1-AB0F-0C754F3AD670}"/>
+                <a16:creationId xmlns:a16="http://schemas.microsoft.com/office/drawing/2014/main" id="{6F116386-D81D-4B46-B7E5-741EC6D29952}"/>
               </a:ext>
             </a:extLst>
           </p:cNvPr>
@@ -4252,16 +4363,51 @@
           <a:p>
             <a:r>
               <a:rPr lang="en-US" dirty="0"/>
-              <a:t>JSON File</a:t>
-            </a:r>
-          </a:p>
-          <a:p>
-            <a:r>
-              <a:rPr lang="en-US" dirty="0"/>
-              <a:t>JavaScript File</a:t>
-            </a:r>
-          </a:p>
-          <a:p>
+              <a:t>Implementing, Deploying Custom Alexa Skill</a:t>
+            </a:r>
+          </a:p>
+          <a:p>
+            <a:pPr lvl="1"/>
+            <a:r>
+              <a:rPr lang="en-US" dirty="0"/>
+              <a:t>Alexa Skills Kit Command Line Interface (ASK CLI)</a:t>
+            </a:r>
+          </a:p>
+          <a:p>
+            <a:pPr lvl="1"/>
+            <a:r>
+              <a:rPr lang="en-US" dirty="0"/>
+              <a:t>AWS Lambda</a:t>
+            </a:r>
+          </a:p>
+          <a:p>
+            <a:pPr lvl="1"/>
+            <a:r>
+              <a:rPr lang="en-US" dirty="0"/>
+              <a:t>Node.js</a:t>
+            </a:r>
+          </a:p>
+          <a:p>
+            <a:r>
+              <a:rPr lang="en-US" dirty="0"/>
+              <a:t>How to consume a public API</a:t>
+            </a:r>
+          </a:p>
+          <a:p>
+            <a:pPr lvl="1"/>
+            <a:r>
+              <a:rPr lang="en-US" dirty="0"/>
+              <a:t>Stock data from IEX Trading API</a:t>
+            </a:r>
+          </a:p>
+          <a:p>
+            <a:pPr lvl="2"/>
+            <a:r>
+              <a:rPr lang="en-US" dirty="0">
+                <a:hlinkClick r:id="rId2"/>
+              </a:rPr>
+              <a:t>https://iextrading.com/developer/docs/#getting-started</a:t>
+            </a:r>
             <a:endParaRPr lang="en-US" dirty="0"/>
           </a:p>
         </p:txBody>
@@ -4269,7 +4415,7 @@
     </p:spTree>
     <p:extLst>
       <p:ext uri="{BB962C8B-B14F-4D97-AF65-F5344CB8AC3E}">
-        <p14:creationId xmlns:p14="http://schemas.microsoft.com/office/powerpoint/2010/main" val="1035418609"/>
+        <p14:creationId xmlns:p14="http://schemas.microsoft.com/office/powerpoint/2010/main" val="3985130253"/>
       </p:ext>
     </p:extLst>
   </p:cSld>
@@ -4301,7 +4447,7 @@
           <p:cNvPr id="2" name="Title 1">
             <a:extLst>
               <a:ext uri="{FF2B5EF4-FFF2-40B4-BE49-F238E27FC236}">
-                <a16:creationId xmlns:a16="http://schemas.microsoft.com/office/drawing/2014/main" id="{EFC4A874-CCC4-4998-BDAB-E0A6E1783627}"/>
+                <a16:creationId xmlns:a16="http://schemas.microsoft.com/office/drawing/2014/main" id="{AAF68D47-6D31-43EF-A9AA-C275631E2842}"/>
               </a:ext>
             </a:extLst>
           </p:cNvPr>
@@ -4319,7 +4465,7 @@
           <a:p>
             <a:r>
               <a:rPr lang="en-US" dirty="0"/>
-              <a:t>No, its that simple but there is a bit more…</a:t>
+              <a:t>What Makes a Skill?</a:t>
             </a:r>
           </a:p>
         </p:txBody>
@@ -4329,7 +4475,7 @@
           <p:cNvPr id="3" name="Content Placeholder 2">
             <a:extLst>
               <a:ext uri="{FF2B5EF4-FFF2-40B4-BE49-F238E27FC236}">
-                <a16:creationId xmlns:a16="http://schemas.microsoft.com/office/drawing/2014/main" id="{F0A553D2-B111-42C0-9A6A-010365C72DD6}"/>
+                <a16:creationId xmlns:a16="http://schemas.microsoft.com/office/drawing/2014/main" id="{CE4643B2-1E5E-43B1-AB0F-0C754F3AD670}"/>
               </a:ext>
             </a:extLst>
           </p:cNvPr>
@@ -4347,62 +4493,13 @@
           <a:p>
             <a:r>
               <a:rPr lang="en-US" dirty="0"/>
-              <a:t>Interaction Model (JSON File)</a:t>
-            </a:r>
-          </a:p>
-          <a:p>
-            <a:pPr lvl="1"/>
-            <a:r>
-              <a:rPr lang="en-US" dirty="0"/>
-              <a:t>Invocation Name</a:t>
-            </a:r>
-          </a:p>
-          <a:p>
-            <a:pPr lvl="1"/>
-            <a:r>
-              <a:rPr lang="en-US" dirty="0"/>
-              <a:t>Intents</a:t>
-            </a:r>
-          </a:p>
-          <a:p>
-            <a:pPr lvl="2"/>
-            <a:r>
-              <a:rPr lang="en-US" dirty="0"/>
-              <a:t>Built-In Intents</a:t>
-            </a:r>
-          </a:p>
-          <a:p>
-            <a:pPr lvl="2"/>
-            <a:r>
-              <a:rPr lang="en-US" dirty="0"/>
-              <a:t>User-defined Intents</a:t>
-            </a:r>
-          </a:p>
-          <a:p>
-            <a:pPr lvl="1"/>
-            <a:r>
-              <a:rPr lang="en-US" dirty="0"/>
-              <a:t>Slot Types</a:t>
-            </a:r>
-          </a:p>
-          <a:p>
-            <a:r>
-              <a:rPr lang="en-US" dirty="0"/>
-              <a:t>Logic (JavaScript File)</a:t>
-            </a:r>
-          </a:p>
-          <a:p>
-            <a:pPr lvl="1"/>
-            <a:r>
-              <a:rPr lang="en-US" dirty="0"/>
-              <a:t>AWS Lambda</a:t>
-            </a:r>
-          </a:p>
-          <a:p>
-            <a:pPr lvl="1"/>
-            <a:r>
-              <a:rPr lang="en-US" dirty="0"/>
-              <a:t>API</a:t>
+              <a:t>JSON File</a:t>
+            </a:r>
+          </a:p>
+          <a:p>
+            <a:r>
+              <a:rPr lang="en-US" dirty="0"/>
+              <a:t>JavaScript File</a:t>
             </a:r>
           </a:p>
           <a:p>
@@ -4413,7 +4510,7 @@
     </p:spTree>
     <p:extLst>
       <p:ext uri="{BB962C8B-B14F-4D97-AF65-F5344CB8AC3E}">
-        <p14:creationId xmlns:p14="http://schemas.microsoft.com/office/powerpoint/2010/main" val="3693376404"/>
+        <p14:creationId xmlns:p14="http://schemas.microsoft.com/office/powerpoint/2010/main" val="1035418609"/>
       </p:ext>
     </p:extLst>
   </p:cSld>
@@ -4445,7 +4542,7 @@
           <p:cNvPr id="2" name="Title 1">
             <a:extLst>
               <a:ext uri="{FF2B5EF4-FFF2-40B4-BE49-F238E27FC236}">
-                <a16:creationId xmlns:a16="http://schemas.microsoft.com/office/drawing/2014/main" id="{69D563AD-3ACB-4C04-A21D-A27B271EA43A}"/>
+                <a16:creationId xmlns:a16="http://schemas.microsoft.com/office/drawing/2014/main" id="{EFC4A874-CCC4-4998-BDAB-E0A6E1783627}"/>
               </a:ext>
             </a:extLst>
           </p:cNvPr>
@@ -4463,56 +4560,101 @@
           <a:p>
             <a:r>
               <a:rPr lang="en-US" dirty="0"/>
+              <a:t>No, its that simple but there is a bit more…</a:t>
+            </a:r>
+          </a:p>
+        </p:txBody>
+      </p:sp>
+      <p:sp>
+        <p:nvSpPr>
+          <p:cNvPr id="3" name="Content Placeholder 2">
+            <a:extLst>
+              <a:ext uri="{FF2B5EF4-FFF2-40B4-BE49-F238E27FC236}">
+                <a16:creationId xmlns:a16="http://schemas.microsoft.com/office/drawing/2014/main" id="{F0A553D2-B111-42C0-9A6A-010365C72DD6}"/>
+              </a:ext>
+            </a:extLst>
+          </p:cNvPr>
+          <p:cNvSpPr>
+            <a:spLocks noGrp="1"/>
+          </p:cNvSpPr>
+          <p:nvPr>
+            <p:ph idx="1"/>
+          </p:nvPr>
+        </p:nvSpPr>
+        <p:spPr/>
+        <p:txBody>
+          <a:bodyPr/>
+          <a:lstStyle/>
+          <a:p>
+            <a:r>
+              <a:rPr lang="en-US" dirty="0"/>
+              <a:t>Interaction Model (JSON File)</a:t>
+            </a:r>
+          </a:p>
+          <a:p>
+            <a:pPr lvl="1"/>
+            <a:r>
+              <a:rPr lang="en-US" dirty="0"/>
               <a:t>Invocation Name</a:t>
             </a:r>
           </a:p>
-        </p:txBody>
-      </p:sp>
-      <p:sp>
-        <p:nvSpPr>
-          <p:cNvPr id="3" name="Content Placeholder 2">
-            <a:extLst>
-              <a:ext uri="{FF2B5EF4-FFF2-40B4-BE49-F238E27FC236}">
-                <a16:creationId xmlns:a16="http://schemas.microsoft.com/office/drawing/2014/main" id="{1D6D181A-2A0D-400E-9329-7797534DE5CB}"/>
-              </a:ext>
-            </a:extLst>
-          </p:cNvPr>
-          <p:cNvSpPr>
-            <a:spLocks noGrp="1"/>
-          </p:cNvSpPr>
-          <p:nvPr>
-            <p:ph idx="1"/>
-          </p:nvPr>
-        </p:nvSpPr>
-        <p:spPr/>
-        <p:txBody>
-          <a:bodyPr/>
-          <a:lstStyle/>
-          <a:p>
-            <a:r>
-              <a:rPr lang="en-US" dirty="0"/>
-              <a:t>The name that the user will use to start the interaction with your custom skill</a:t>
-            </a:r>
-          </a:p>
-          <a:p>
-            <a:r>
-              <a:rPr lang="en-US" dirty="0"/>
-              <a:t>For example, if the invocation name is “ESPN”, users can say:</a:t>
-            </a:r>
-          </a:p>
           <a:p>
             <a:pPr lvl="1"/>
             <a:r>
               <a:rPr lang="en-US" dirty="0"/>
-              <a:t>“Alexa, ask ESPN for the score of the Viking game.”</a:t>
-            </a:r>
+              <a:t>Intents</a:t>
+            </a:r>
+          </a:p>
+          <a:p>
+            <a:pPr lvl="2"/>
+            <a:r>
+              <a:rPr lang="en-US" dirty="0"/>
+              <a:t>Built-In Intents</a:t>
+            </a:r>
+          </a:p>
+          <a:p>
+            <a:pPr lvl="2"/>
+            <a:r>
+              <a:rPr lang="en-US" dirty="0"/>
+              <a:t>User-defined Intents</a:t>
+            </a:r>
+          </a:p>
+          <a:p>
+            <a:pPr lvl="1"/>
+            <a:r>
+              <a:rPr lang="en-US" dirty="0"/>
+              <a:t>Slot Types</a:t>
+            </a:r>
+          </a:p>
+          <a:p>
+            <a:r>
+              <a:rPr lang="en-US" dirty="0"/>
+              <a:t>Logic (JavaScript File)</a:t>
+            </a:r>
+          </a:p>
+          <a:p>
+            <a:pPr lvl="1"/>
+            <a:r>
+              <a:rPr lang="en-US" dirty="0"/>
+              <a:t>AWS Lambda</a:t>
+            </a:r>
+          </a:p>
+          <a:p>
+            <a:pPr lvl="1"/>
+            <a:r>
+              <a:rPr lang="en-US" dirty="0"/>
+              <a:t>API</a:t>
+            </a:r>
+          </a:p>
+          <a:p>
+            <a:endParaRPr lang="en-US" dirty="0"/>
           </a:p>
         </p:txBody>
       </p:sp>
     </p:spTree>
     <p:extLst>
       <p:ext uri="{BB962C8B-B14F-4D97-AF65-F5344CB8AC3E}">
-        <p14:creationId xmlns:p14="http://schemas.microsoft.com/office/powerpoint/2010/main" val="1225673664"/>
+        <p14:creationId xmlns:p14="http://schemas.microsoft.com/office/powerpoint/2010/main" val="3693376404"/>
       </p:ext>
     </p:extLst>
   </p:cSld>
@@ -4544,7 +4686,7 @@
           <p:cNvPr id="2" name="Title 1">
             <a:extLst>
               <a:ext uri="{FF2B5EF4-FFF2-40B4-BE49-F238E27FC236}">
-                <a16:creationId xmlns:a16="http://schemas.microsoft.com/office/drawing/2014/main" id="{A1BD2057-6022-4829-87F9-368062B452E3}"/>
+                <a16:creationId xmlns:a16="http://schemas.microsoft.com/office/drawing/2014/main" id="{69D563AD-3ACB-4C04-A21D-A27B271EA43A}"/>
               </a:ext>
             </a:extLst>
           </p:cNvPr>
@@ -4562,7 +4704,7 @@
           <a:p>
             <a:r>
               <a:rPr lang="en-US" dirty="0"/>
-              <a:t>Intents</a:t>
+              <a:t>Invocation Name</a:t>
             </a:r>
           </a:p>
         </p:txBody>
@@ -4572,7 +4714,7 @@
           <p:cNvPr id="3" name="Content Placeholder 2">
             <a:extLst>
               <a:ext uri="{FF2B5EF4-FFF2-40B4-BE49-F238E27FC236}">
-                <a16:creationId xmlns:a16="http://schemas.microsoft.com/office/drawing/2014/main" id="{8A626891-DEE4-4575-B99B-D230647CBC80}"/>
+                <a16:creationId xmlns:a16="http://schemas.microsoft.com/office/drawing/2014/main" id="{1D6D181A-2A0D-400E-9329-7797534DE5CB}"/>
               </a:ext>
             </a:extLst>
           </p:cNvPr>
@@ -4590,93 +4732,28 @@
           <a:p>
             <a:r>
               <a:rPr lang="en-US" dirty="0"/>
-              <a:t>Built-In Intents</a:t>
+              <a:t>The name that the user will use to start the interaction with your custom skill</a:t>
+            </a:r>
+          </a:p>
+          <a:p>
+            <a:r>
+              <a:rPr lang="en-US" dirty="0"/>
+              <a:t>For example, if the invocation name is “ESPN”, users can say:</a:t>
             </a:r>
           </a:p>
           <a:p>
             <a:pPr lvl="1"/>
             <a:r>
-              <a:rPr lang="en-US" dirty="0" err="1"/>
-              <a:t>AMAZON.CancelIntent</a:t>
-            </a:r>
-            <a:endParaRPr lang="en-US" dirty="0"/>
-          </a:p>
-          <a:p>
-            <a:pPr lvl="2"/>
-            <a:r>
-              <a:rPr lang="en-US" dirty="0"/>
-              <a:t>Invoked when user interrupts current intent by saying “Alexa Cancel”</a:t>
-            </a:r>
-          </a:p>
-          <a:p>
-            <a:pPr lvl="1"/>
-            <a:r>
-              <a:rPr lang="en-US" dirty="0" err="1"/>
-              <a:t>AMAZON.HelpIntent</a:t>
-            </a:r>
-            <a:endParaRPr lang="en-US" dirty="0"/>
-          </a:p>
-          <a:p>
-            <a:pPr lvl="2"/>
-            <a:r>
-              <a:rPr lang="en-US" dirty="0"/>
-              <a:t>Invoked when user needs help with what to do within a custom skill</a:t>
-            </a:r>
-          </a:p>
-          <a:p>
-            <a:pPr lvl="2"/>
-            <a:r>
-              <a:rPr lang="en-US" dirty="0"/>
-              <a:t>Provides sample commands</a:t>
-            </a:r>
-          </a:p>
-          <a:p>
-            <a:pPr lvl="1"/>
-            <a:r>
-              <a:rPr lang="en-US" dirty="0" err="1"/>
-              <a:t>AMAZON.FallbackIntent</a:t>
-            </a:r>
-            <a:endParaRPr lang="en-US" dirty="0"/>
-          </a:p>
-          <a:p>
-            <a:pPr lvl="2"/>
-            <a:r>
-              <a:rPr lang="en-US" dirty="0"/>
-              <a:t>Invoked when user’s command does not match any of the other defined intents</a:t>
-            </a:r>
-          </a:p>
-          <a:p>
-            <a:pPr lvl="2"/>
-            <a:r>
-              <a:rPr lang="en-US" dirty="0"/>
-              <a:t>“Sorry I don’t know that one”</a:t>
-            </a:r>
-          </a:p>
-          <a:p>
-            <a:pPr lvl="1"/>
-            <a:r>
-              <a:rPr lang="en-US" dirty="0" err="1"/>
-              <a:t>AMAZON.StopIntent</a:t>
-            </a:r>
-            <a:endParaRPr lang="en-US" dirty="0"/>
-          </a:p>
-          <a:p>
-            <a:pPr lvl="2"/>
-            <a:r>
-              <a:rPr lang="en-US" dirty="0"/>
-              <a:t>Invoked when user wants to stop an open session</a:t>
-            </a:r>
-          </a:p>
-          <a:p>
-            <a:pPr lvl="1"/>
-            <a:endParaRPr lang="en-US" dirty="0"/>
+              <a:rPr lang="en-US" dirty="0"/>
+              <a:t>“Alexa, ask ESPN for the score of the Viking game.”</a:t>
+            </a:r>
           </a:p>
         </p:txBody>
       </p:sp>
     </p:spTree>
     <p:extLst>
       <p:ext uri="{BB962C8B-B14F-4D97-AF65-F5344CB8AC3E}">
-        <p14:creationId xmlns:p14="http://schemas.microsoft.com/office/powerpoint/2010/main" val="2912906413"/>
+        <p14:creationId xmlns:p14="http://schemas.microsoft.com/office/powerpoint/2010/main" val="1225673664"/>
       </p:ext>
     </p:extLst>
   </p:cSld>
@@ -4708,7 +4785,7 @@
           <p:cNvPr id="2" name="Title 1">
             <a:extLst>
               <a:ext uri="{FF2B5EF4-FFF2-40B4-BE49-F238E27FC236}">
-                <a16:creationId xmlns:a16="http://schemas.microsoft.com/office/drawing/2014/main" id="{B6F7ED87-B603-4555-AFBC-8609F81C5D59}"/>
+                <a16:creationId xmlns:a16="http://schemas.microsoft.com/office/drawing/2014/main" id="{A1BD2057-6022-4829-87F9-368062B452E3}"/>
               </a:ext>
             </a:extLst>
           </p:cNvPr>
@@ -4736,7 +4813,7 @@
           <p:cNvPr id="3" name="Content Placeholder 2">
             <a:extLst>
               <a:ext uri="{FF2B5EF4-FFF2-40B4-BE49-F238E27FC236}">
-                <a16:creationId xmlns:a16="http://schemas.microsoft.com/office/drawing/2014/main" id="{0E8108C6-4BA9-47EC-8022-66621475A00D}"/>
+                <a16:creationId xmlns:a16="http://schemas.microsoft.com/office/drawing/2014/main" id="{8A626891-DEE4-4575-B99B-D230647CBC80}"/>
               </a:ext>
             </a:extLst>
           </p:cNvPr>
@@ -4754,53 +4831,93 @@
           <a:p>
             <a:r>
               <a:rPr lang="en-US" dirty="0"/>
-              <a:t>User-defined intents</a:t>
+              <a:t>Built-In Intents</a:t>
             </a:r>
           </a:p>
           <a:p>
             <a:pPr lvl="1"/>
             <a:r>
-              <a:rPr lang="en-US" dirty="0"/>
-              <a:t>Makes your custom skill unique</a:t>
+              <a:rPr lang="en-US" dirty="0" err="1"/>
+              <a:t>AMAZON.CancelIntent</a:t>
+            </a:r>
+            <a:endParaRPr lang="en-US" dirty="0"/>
+          </a:p>
+          <a:p>
+            <a:pPr lvl="2"/>
+            <a:r>
+              <a:rPr lang="en-US" dirty="0"/>
+              <a:t>Invoked when user interrupts current intent by saying “Alexa Cancel”</a:t>
             </a:r>
           </a:p>
           <a:p>
             <a:pPr lvl="1"/>
             <a:r>
-              <a:rPr lang="en-US" dirty="0"/>
-              <a:t>“Alexa ask ESPN for the score of the Viking game”</a:t>
+              <a:rPr lang="en-US" dirty="0" err="1"/>
+              <a:t>AMAZON.HelpIntent</a:t>
+            </a:r>
+            <a:endParaRPr lang="en-US" dirty="0"/>
+          </a:p>
+          <a:p>
+            <a:pPr lvl="2"/>
+            <a:r>
+              <a:rPr lang="en-US" dirty="0"/>
+              <a:t>Invoked when user needs help with what to do within a custom skill</a:t>
+            </a:r>
+          </a:p>
+          <a:p>
+            <a:pPr lvl="2"/>
+            <a:r>
+              <a:rPr lang="en-US" dirty="0"/>
+              <a:t>Provides sample commands</a:t>
             </a:r>
           </a:p>
           <a:p>
             <a:pPr lvl="1"/>
             <a:r>
-              <a:rPr lang="en-US" dirty="0"/>
-              <a:t>“Alexa ask Google for the top trends”</a:t>
-            </a:r>
-          </a:p>
-          <a:p>
-            <a:r>
-              <a:rPr lang="en-US" dirty="0"/>
-              <a:t>Made up of </a:t>
-            </a:r>
-            <a:r>
-              <a:rPr lang="en-US" b="1" dirty="0"/>
-              <a:t>Utterances</a:t>
+              <a:rPr lang="en-US" dirty="0" err="1"/>
+              <a:t>AMAZON.FallbackIntent</a:t>
+            </a:r>
+            <a:endParaRPr lang="en-US" dirty="0"/>
+          </a:p>
+          <a:p>
+            <a:pPr lvl="2"/>
+            <a:r>
+              <a:rPr lang="en-US" dirty="0"/>
+              <a:t>Invoked when user’s command does not match any of the other defined intents</a:t>
+            </a:r>
+          </a:p>
+          <a:p>
+            <a:pPr lvl="2"/>
+            <a:r>
+              <a:rPr lang="en-US" dirty="0"/>
+              <a:t>“Sorry I don’t know that one”</a:t>
             </a:r>
           </a:p>
           <a:p>
             <a:pPr lvl="1"/>
             <a:r>
-              <a:rPr lang="en-US" dirty="0"/>
-              <a:t>Utterances – phases the user might say</a:t>
-            </a:r>
+              <a:rPr lang="en-US" dirty="0" err="1"/>
+              <a:t>AMAZON.StopIntent</a:t>
+            </a:r>
+            <a:endParaRPr lang="en-US" dirty="0"/>
+          </a:p>
+          <a:p>
+            <a:pPr lvl="2"/>
+            <a:r>
+              <a:rPr lang="en-US" dirty="0"/>
+              <a:t>Invoked when user wants to stop an open session</a:t>
+            </a:r>
+          </a:p>
+          <a:p>
+            <a:pPr lvl="1"/>
+            <a:endParaRPr lang="en-US" dirty="0"/>
           </a:p>
         </p:txBody>
       </p:sp>
     </p:spTree>
     <p:extLst>
       <p:ext uri="{BB962C8B-B14F-4D97-AF65-F5344CB8AC3E}">
-        <p14:creationId xmlns:p14="http://schemas.microsoft.com/office/powerpoint/2010/main" val="2608405855"/>
+        <p14:creationId xmlns:p14="http://schemas.microsoft.com/office/powerpoint/2010/main" val="2912906413"/>
       </p:ext>
     </p:extLst>
   </p:cSld>
@@ -4832,7 +4949,7 @@
           <p:cNvPr id="2" name="Title 1">
             <a:extLst>
               <a:ext uri="{FF2B5EF4-FFF2-40B4-BE49-F238E27FC236}">
-                <a16:creationId xmlns:a16="http://schemas.microsoft.com/office/drawing/2014/main" id="{D23C619C-88CC-4D75-8EEA-13B6B4E0AB85}"/>
+                <a16:creationId xmlns:a16="http://schemas.microsoft.com/office/drawing/2014/main" id="{B6F7ED87-B603-4555-AFBC-8609F81C5D59}"/>
               </a:ext>
             </a:extLst>
           </p:cNvPr>
@@ -4850,7 +4967,7 @@
           <a:p>
             <a:r>
               <a:rPr lang="en-US" dirty="0"/>
-              <a:t>Slot Types</a:t>
+              <a:t>Intents</a:t>
             </a:r>
           </a:p>
         </p:txBody>
@@ -4860,7 +4977,7 @@
           <p:cNvPr id="3" name="Content Placeholder 2">
             <a:extLst>
               <a:ext uri="{FF2B5EF4-FFF2-40B4-BE49-F238E27FC236}">
-                <a16:creationId xmlns:a16="http://schemas.microsoft.com/office/drawing/2014/main" id="{7F5E6E1A-1276-4DCA-800F-1A049EADC4D7}"/>
+                <a16:creationId xmlns:a16="http://schemas.microsoft.com/office/drawing/2014/main" id="{0E8108C6-4BA9-47EC-8022-66621475A00D}"/>
               </a:ext>
             </a:extLst>
           </p:cNvPr>
@@ -4873,60 +4990,66 @@
         </p:nvSpPr>
         <p:spPr/>
         <p:txBody>
-          <a:bodyPr>
-            <a:normAutofit/>
-          </a:bodyPr>
-          <a:lstStyle/>
-          <a:p>
-            <a:r>
-              <a:rPr lang="en-US" dirty="0"/>
-              <a:t>Variables within a utterance</a:t>
-            </a:r>
-          </a:p>
-          <a:p>
-            <a:r>
-              <a:rPr lang="en-US" dirty="0"/>
-              <a:t>Utterances can have multiple slots</a:t>
-            </a:r>
-          </a:p>
-          <a:p>
-            <a:r>
-              <a:rPr lang="en-US" dirty="0"/>
-              <a:t>User: “Alexa ask ESPN what the score of the Minnesota Viking football game.”</a:t>
-            </a:r>
-          </a:p>
-          <a:p>
-            <a:r>
-              <a:rPr lang="en-US" dirty="0"/>
-              <a:t>User: “Alexa ask ESPN what the score of the {team name} {sport name} game.”</a:t>
+          <a:bodyPr/>
+          <a:lstStyle/>
+          <a:p>
+            <a:r>
+              <a:rPr lang="en-US" dirty="0"/>
+              <a:t>User-defined intents</a:t>
             </a:r>
           </a:p>
           <a:p>
             <a:pPr lvl="1"/>
             <a:r>
               <a:rPr lang="en-US" dirty="0"/>
-              <a:t>{team name}</a:t>
-            </a:r>
-          </a:p>
-          <a:p>
-            <a:pPr lvl="2"/>
-            <a:r>
-              <a:rPr lang="en-US" dirty="0"/>
-              <a:t>Minnesota Vikings, Green Bay Packers</a:t>
+              <a:t>Makes your custom skill unique</a:t>
             </a:r>
           </a:p>
           <a:p>
             <a:pPr lvl="1"/>
             <a:r>
               <a:rPr lang="en-US" dirty="0"/>
-              <a:t>{sport}</a:t>
-            </a:r>
-          </a:p>
-          <a:p>
-            <a:pPr lvl="2"/>
-            <a:r>
-              <a:rPr lang="en-US" dirty="0"/>
-              <a:t>Football, hockey, baseball</a:t>
+              <a:t>Example </a:t>
+            </a:r>
+            <a:r>
+              <a:rPr lang="en-US" b="1" dirty="0"/>
+              <a:t>Score Intent</a:t>
+            </a:r>
+            <a:r>
+              <a:rPr lang="en-US" dirty="0"/>
+              <a:t>: “Alexa ask ESPN for the score of the Viking game”</a:t>
+            </a:r>
+          </a:p>
+          <a:p>
+            <a:pPr lvl="1"/>
+            <a:r>
+              <a:rPr lang="en-US" dirty="0"/>
+              <a:t>Example </a:t>
+            </a:r>
+            <a:r>
+              <a:rPr lang="en-US" b="1" dirty="0"/>
+              <a:t>Top Trend Intent</a:t>
+            </a:r>
+            <a:r>
+              <a:rPr lang="en-US" dirty="0"/>
+              <a:t>: “Alexa ask Google for the top trends”</a:t>
+            </a:r>
+          </a:p>
+          <a:p>
+            <a:r>
+              <a:rPr lang="en-US" dirty="0"/>
+              <a:t>Made up of </a:t>
+            </a:r>
+            <a:r>
+              <a:rPr lang="en-US" b="1" dirty="0"/>
+              <a:t>Utterances</a:t>
+            </a:r>
+          </a:p>
+          <a:p>
+            <a:pPr lvl="1"/>
+            <a:r>
+              <a:rPr lang="en-US" dirty="0"/>
+              <a:t>Utterances – phases the user might say</a:t>
             </a:r>
           </a:p>
         </p:txBody>
@@ -4934,7 +5057,7 @@
     </p:spTree>
     <p:extLst>
       <p:ext uri="{BB962C8B-B14F-4D97-AF65-F5344CB8AC3E}">
-        <p14:creationId xmlns:p14="http://schemas.microsoft.com/office/powerpoint/2010/main" val="4124802825"/>
+        <p14:creationId xmlns:p14="http://schemas.microsoft.com/office/powerpoint/2010/main" val="2608405855"/>
       </p:ext>
     </p:extLst>
   </p:cSld>

</xml_diff>